<commit_message>
Updated menu icons texture
Improved the menu icons and canvas texture.

When hovering on buttons, the color changes to red
</commit_message>
<xml_diff>
--- a/docs/designs/menu.pptx
+++ b/docs/designs/menu.pptx
@@ -247,7 +247,7 @@
           <a:p>
             <a:fld id="{E8FA1CFD-67F9-4333-BA11-E82133BFD29A}" type="datetimeFigureOut">
               <a:rPr lang="en-US" smtClean="0"/>
-              <a:t>7/11/2018</a:t>
+              <a:t>7/20/2018</a:t>
             </a:fld>
             <a:endParaRPr lang="en-US"/>
           </a:p>
@@ -417,7 +417,7 @@
           <a:p>
             <a:fld id="{E8FA1CFD-67F9-4333-BA11-E82133BFD29A}" type="datetimeFigureOut">
               <a:rPr lang="en-US" smtClean="0"/>
-              <a:t>7/11/2018</a:t>
+              <a:t>7/20/2018</a:t>
             </a:fld>
             <a:endParaRPr lang="en-US"/>
           </a:p>
@@ -597,7 +597,7 @@
           <a:p>
             <a:fld id="{E8FA1CFD-67F9-4333-BA11-E82133BFD29A}" type="datetimeFigureOut">
               <a:rPr lang="en-US" smtClean="0"/>
-              <a:t>7/11/2018</a:t>
+              <a:t>7/20/2018</a:t>
             </a:fld>
             <a:endParaRPr lang="en-US"/>
           </a:p>
@@ -767,7 +767,7 @@
           <a:p>
             <a:fld id="{E8FA1CFD-67F9-4333-BA11-E82133BFD29A}" type="datetimeFigureOut">
               <a:rPr lang="en-US" smtClean="0"/>
-              <a:t>7/11/2018</a:t>
+              <a:t>7/20/2018</a:t>
             </a:fld>
             <a:endParaRPr lang="en-US"/>
           </a:p>
@@ -1013,7 +1013,7 @@
           <a:p>
             <a:fld id="{E8FA1CFD-67F9-4333-BA11-E82133BFD29A}" type="datetimeFigureOut">
               <a:rPr lang="en-US" smtClean="0"/>
-              <a:t>7/11/2018</a:t>
+              <a:t>7/20/2018</a:t>
             </a:fld>
             <a:endParaRPr lang="en-US"/>
           </a:p>
@@ -1245,7 +1245,7 @@
           <a:p>
             <a:fld id="{E8FA1CFD-67F9-4333-BA11-E82133BFD29A}" type="datetimeFigureOut">
               <a:rPr lang="en-US" smtClean="0"/>
-              <a:t>7/11/2018</a:t>
+              <a:t>7/20/2018</a:t>
             </a:fld>
             <a:endParaRPr lang="en-US"/>
           </a:p>
@@ -1612,7 +1612,7 @@
           <a:p>
             <a:fld id="{E8FA1CFD-67F9-4333-BA11-E82133BFD29A}" type="datetimeFigureOut">
               <a:rPr lang="en-US" smtClean="0"/>
-              <a:t>7/11/2018</a:t>
+              <a:t>7/20/2018</a:t>
             </a:fld>
             <a:endParaRPr lang="en-US"/>
           </a:p>
@@ -1730,7 +1730,7 @@
           <a:p>
             <a:fld id="{E8FA1CFD-67F9-4333-BA11-E82133BFD29A}" type="datetimeFigureOut">
               <a:rPr lang="en-US" smtClean="0"/>
-              <a:t>7/11/2018</a:t>
+              <a:t>7/20/2018</a:t>
             </a:fld>
             <a:endParaRPr lang="en-US"/>
           </a:p>
@@ -1825,7 +1825,7 @@
           <a:p>
             <a:fld id="{E8FA1CFD-67F9-4333-BA11-E82133BFD29A}" type="datetimeFigureOut">
               <a:rPr lang="en-US" smtClean="0"/>
-              <a:t>7/11/2018</a:t>
+              <a:t>7/20/2018</a:t>
             </a:fld>
             <a:endParaRPr lang="en-US"/>
           </a:p>
@@ -2102,7 +2102,7 @@
           <a:p>
             <a:fld id="{E8FA1CFD-67F9-4333-BA11-E82133BFD29A}" type="datetimeFigureOut">
               <a:rPr lang="en-US" smtClean="0"/>
-              <a:t>7/11/2018</a:t>
+              <a:t>7/20/2018</a:t>
             </a:fld>
             <a:endParaRPr lang="en-US"/>
           </a:p>
@@ -2359,7 +2359,7 @@
           <a:p>
             <a:fld id="{E8FA1CFD-67F9-4333-BA11-E82133BFD29A}" type="datetimeFigureOut">
               <a:rPr lang="en-US" smtClean="0"/>
-              <a:t>7/11/2018</a:t>
+              <a:t>7/20/2018</a:t>
             </a:fld>
             <a:endParaRPr lang="en-US"/>
           </a:p>
@@ -2572,7 +2572,7 @@
           <a:p>
             <a:fld id="{E8FA1CFD-67F9-4333-BA11-E82133BFD29A}" type="datetimeFigureOut">
               <a:rPr lang="en-US" smtClean="0"/>
-              <a:t>7/11/2018</a:t>
+              <a:t>7/20/2018</a:t>
             </a:fld>
             <a:endParaRPr lang="en-US"/>
           </a:p>
@@ -4743,146 +4743,59 @@
       </p:grpSpPr>
       <p:sp>
         <p:nvSpPr>
-          <p:cNvPr id="5" name="TextBox 4"/>
-          <p:cNvSpPr txBox="1"/>
-          <p:nvPr/>
-        </p:nvSpPr>
-        <p:spPr>
-          <a:xfrm>
-            <a:off x="2504192" y="928501"/>
-            <a:ext cx="1760739" cy="646331"/>
-          </a:xfrm>
-          <a:prstGeom prst="rect">
-            <a:avLst/>
-          </a:prstGeom>
-          <a:noFill/>
-        </p:spPr>
-        <p:txBody>
-          <a:bodyPr wrap="square" rtlCol="0">
-            <a:spAutoFit/>
-          </a:bodyPr>
-          <a:lstStyle/>
-          <a:p>
-            <a:r>
-              <a:rPr lang="en-US" sz="3600" dirty="0" smtClean="0"/>
-              <a:t>CLASSIC</a:t>
-            </a:r>
-            <a:endParaRPr lang="en-US" sz="3600" dirty="0"/>
-          </a:p>
-        </p:txBody>
-      </p:sp>
-      <p:pic>
-        <p:nvPicPr>
-          <p:cNvPr id="6" name="Picture 5"/>
-          <p:cNvPicPr>
-            <a:picLocks noChangeAspect="1"/>
-          </p:cNvPicPr>
-          <p:nvPr/>
-        </p:nvPicPr>
-        <p:blipFill>
-          <a:blip r:embed="rId2" cstate="print">
-            <a:extLst>
-              <a:ext uri="{28A0092B-C50C-407E-A947-70E740481C1C}">
-                <a14:useLocalDpi xmlns:a14="http://schemas.microsoft.com/office/drawing/2010/main" val="0"/>
-              </a:ext>
-            </a:extLst>
-          </a:blip>
-          <a:stretch>
-            <a:fillRect/>
-          </a:stretch>
-        </p:blipFill>
-        <p:spPr>
-          <a:xfrm>
-            <a:off x="6725979" y="1091590"/>
-            <a:ext cx="1318202" cy="1250353"/>
-          </a:xfrm>
-          <a:prstGeom prst="rect">
-            <a:avLst/>
-          </a:prstGeom>
-        </p:spPr>
-      </p:pic>
-      <p:sp>
-        <p:nvSpPr>
-          <p:cNvPr id="7" name="TextBox 6"/>
-          <p:cNvSpPr txBox="1"/>
-          <p:nvPr/>
-        </p:nvSpPr>
-        <p:spPr>
-          <a:xfrm>
-            <a:off x="2555362" y="1514620"/>
-            <a:ext cx="3203422" cy="461665"/>
-          </a:xfrm>
-          <a:prstGeom prst="rect">
-            <a:avLst/>
-          </a:prstGeom>
-          <a:noFill/>
-        </p:spPr>
-        <p:txBody>
-          <a:bodyPr wrap="square" rtlCol="0">
-            <a:spAutoFit/>
-          </a:bodyPr>
-          <a:lstStyle/>
-          <a:p>
-            <a:r>
-              <a:rPr lang="en-US" sz="2400" dirty="0" smtClean="0"/>
-              <a:t>Time:                 00:00:0.0</a:t>
-            </a:r>
-            <a:endParaRPr lang="en-US" sz="2400" dirty="0"/>
-          </a:p>
-        </p:txBody>
-      </p:sp>
-      <p:sp>
-        <p:nvSpPr>
-          <p:cNvPr id="8" name="TextBox 7"/>
-          <p:cNvSpPr txBox="1"/>
-          <p:nvPr/>
-        </p:nvSpPr>
-        <p:spPr>
-          <a:xfrm>
-            <a:off x="2555362" y="1954873"/>
-            <a:ext cx="3203421" cy="461665"/>
-          </a:xfrm>
-          <a:prstGeom prst="rect">
-            <a:avLst/>
-          </a:prstGeom>
-          <a:noFill/>
-        </p:spPr>
-        <p:txBody>
-          <a:bodyPr wrap="square" rtlCol="0">
-            <a:spAutoFit/>
-          </a:bodyPr>
-          <a:lstStyle/>
-          <a:p>
-            <a:r>
-              <a:rPr lang="en-US" sz="2400" dirty="0" smtClean="0"/>
-              <a:t>Moves:              0</a:t>
-            </a:r>
-            <a:endParaRPr lang="en-US" sz="2400" dirty="0"/>
-          </a:p>
-        </p:txBody>
-      </p:sp>
-      <p:sp>
-        <p:nvSpPr>
-          <p:cNvPr id="30" name="Isosceles Triangle 29"/>
+          <p:cNvPr id="56" name="Rounded Rectangle 55"/>
           <p:cNvSpPr/>
           <p:nvPr/>
         </p:nvSpPr>
         <p:spPr>
-          <a:xfrm rot="5400000">
-            <a:off x="6747705" y="5599018"/>
-            <a:ext cx="1032534" cy="661869"/>
-          </a:xfrm>
-          <a:prstGeom prst="triangle">
+          <a:xfrm>
+            <a:off x="2336799" y="904678"/>
+            <a:ext cx="7300911" cy="1599507"/>
+          </a:xfrm>
+          <a:prstGeom prst="roundRect">
             <a:avLst>
-              <a:gd name="adj" fmla="val 48085"/>
+              <a:gd name="adj" fmla="val 6345"/>
             </a:avLst>
           </a:prstGeom>
-          <a:solidFill>
-            <a:schemeClr val="tx1"/>
-          </a:solidFill>
-          <a:ln>
+          <a:gradFill flip="none" rotWithShape="1">
+            <a:gsLst>
+              <a:gs pos="0">
+                <a:schemeClr val="accent1">
+                  <a:shade val="30000"/>
+                  <a:satMod val="115000"/>
+                </a:schemeClr>
+              </a:gs>
+              <a:gs pos="50000">
+                <a:schemeClr val="accent1">
+                  <a:shade val="67500"/>
+                  <a:satMod val="115000"/>
+                </a:schemeClr>
+              </a:gs>
+              <a:gs pos="100000">
+                <a:schemeClr val="accent1">
+                  <a:shade val="100000"/>
+                  <a:satMod val="115000"/>
+                </a:schemeClr>
+              </a:gs>
+            </a:gsLst>
+            <a:lin ang="13500000" scaled="1"/>
+            <a:tileRect/>
+          </a:gradFill>
+          <a:ln w="57150">
             <a:noFill/>
           </a:ln>
+          <a:effectLst/>
+          <a:scene3d>
+            <a:camera prst="orthographicFront">
+              <a:rot lat="0" lon="0" rev="0"/>
+            </a:camera>
+            <a:lightRig rig="chilly" dir="t">
+              <a:rot lat="0" lon="0" rev="18480000"/>
+            </a:lightRig>
+          </a:scene3d>
+          <a:sp3d prstMaterial="clear">
+            <a:bevelT h="63500"/>
+          </a:sp3d>
         </p:spPr>
         <p:style>
           <a:lnRef idx="2">
@@ -4911,82 +4824,94 @@
       </p:sp>
       <p:sp>
         <p:nvSpPr>
-          <p:cNvPr id="31" name="Isosceles Triangle 30"/>
-          <p:cNvSpPr/>
+          <p:cNvPr id="5" name="TextBox 4"/>
+          <p:cNvSpPr txBox="1"/>
           <p:nvPr/>
         </p:nvSpPr>
         <p:spPr>
-          <a:xfrm rot="16200000">
-            <a:off x="3866085" y="5633958"/>
-            <a:ext cx="1062300" cy="661869"/>
-          </a:xfrm>
-          <a:prstGeom prst="triangle">
-            <a:avLst>
-              <a:gd name="adj" fmla="val 46889"/>
-            </a:avLst>
-          </a:prstGeom>
-          <a:solidFill>
-            <a:schemeClr val="tx1"/>
-          </a:solidFill>
-          <a:ln>
-            <a:noFill/>
-          </a:ln>
-        </p:spPr>
-        <p:style>
-          <a:lnRef idx="2">
-            <a:schemeClr val="accent1">
-              <a:shade val="50000"/>
-            </a:schemeClr>
-          </a:lnRef>
-          <a:fillRef idx="1">
-            <a:schemeClr val="accent1"/>
-          </a:fillRef>
-          <a:effectRef idx="0">
-            <a:schemeClr val="accent1"/>
-          </a:effectRef>
-          <a:fontRef idx="minor">
-            <a:schemeClr val="lt1"/>
-          </a:fontRef>
-        </p:style>
-        <p:txBody>
-          <a:bodyPr rtlCol="0" anchor="ctr"/>
-          <a:lstStyle/>
-          <a:p>
-            <a:pPr algn="ctr"/>
-            <a:endParaRPr lang="en-US"/>
-          </a:p>
-        </p:txBody>
-      </p:sp>
-      <p:pic>
-        <p:nvPicPr>
-          <p:cNvPr id="32" name="Picture 31"/>
-          <p:cNvPicPr>
-            <a:picLocks noChangeAspect="1"/>
-          </p:cNvPicPr>
-          <p:nvPr/>
-        </p:nvPicPr>
-        <p:blipFill>
-          <a:blip r:embed="rId3" cstate="print">
-            <a:extLst>
-              <a:ext uri="{28A0092B-C50C-407E-A947-70E740481C1C}">
-                <a14:useLocalDpi xmlns:a14="http://schemas.microsoft.com/office/drawing/2010/main" val="0"/>
-              </a:ext>
-            </a:extLst>
-          </a:blip>
-          <a:stretch>
-            <a:fillRect/>
-          </a:stretch>
-        </p:blipFill>
-        <p:spPr>
-          <a:xfrm rot="16200000">
-            <a:off x="8194516" y="1423684"/>
-            <a:ext cx="919774" cy="869144"/>
+          <a:xfrm>
+            <a:off x="2504192" y="928501"/>
+            <a:ext cx="1760739" cy="646331"/>
           </a:xfrm>
           <a:prstGeom prst="rect">
             <a:avLst/>
           </a:prstGeom>
-        </p:spPr>
-      </p:pic>
+          <a:noFill/>
+        </p:spPr>
+        <p:txBody>
+          <a:bodyPr wrap="square" rtlCol="0">
+            <a:spAutoFit/>
+          </a:bodyPr>
+          <a:lstStyle/>
+          <a:p>
+            <a:r>
+              <a:rPr lang="en-US" sz="3600" dirty="0" smtClean="0"/>
+              <a:t>CLASSIC</a:t>
+            </a:r>
+            <a:endParaRPr lang="en-US" sz="3600" dirty="0"/>
+          </a:p>
+        </p:txBody>
+      </p:sp>
+      <p:sp>
+        <p:nvSpPr>
+          <p:cNvPr id="7" name="TextBox 6"/>
+          <p:cNvSpPr txBox="1"/>
+          <p:nvPr/>
+        </p:nvSpPr>
+        <p:spPr>
+          <a:xfrm>
+            <a:off x="2555362" y="1514620"/>
+            <a:ext cx="3203422" cy="461665"/>
+          </a:xfrm>
+          <a:prstGeom prst="rect">
+            <a:avLst/>
+          </a:prstGeom>
+          <a:noFill/>
+        </p:spPr>
+        <p:txBody>
+          <a:bodyPr wrap="square" rtlCol="0">
+            <a:spAutoFit/>
+          </a:bodyPr>
+          <a:lstStyle/>
+          <a:p>
+            <a:r>
+              <a:rPr lang="en-US" sz="2400" dirty="0" smtClean="0"/>
+              <a:t>Time:                 00:00:0.0</a:t>
+            </a:r>
+            <a:endParaRPr lang="en-US" sz="2400" dirty="0"/>
+          </a:p>
+        </p:txBody>
+      </p:sp>
+      <p:sp>
+        <p:nvSpPr>
+          <p:cNvPr id="8" name="TextBox 7"/>
+          <p:cNvSpPr txBox="1"/>
+          <p:nvPr/>
+        </p:nvSpPr>
+        <p:spPr>
+          <a:xfrm>
+            <a:off x="2555362" y="1954873"/>
+            <a:ext cx="3203421" cy="461665"/>
+          </a:xfrm>
+          <a:prstGeom prst="rect">
+            <a:avLst/>
+          </a:prstGeom>
+          <a:noFill/>
+        </p:spPr>
+        <p:txBody>
+          <a:bodyPr wrap="square" rtlCol="0">
+            <a:spAutoFit/>
+          </a:bodyPr>
+          <a:lstStyle/>
+          <a:p>
+            <a:r>
+              <a:rPr lang="en-US" sz="2400" dirty="0" smtClean="0"/>
+              <a:t>Moves:              0</a:t>
+            </a:r>
+            <a:endParaRPr lang="en-US" sz="2400" dirty="0"/>
+          </a:p>
+        </p:txBody>
+      </p:sp>
       <p:sp>
         <p:nvSpPr>
           <p:cNvPr id="34" name="TextBox 33"/>
@@ -5017,282 +4942,1330 @@
           </a:p>
         </p:txBody>
       </p:sp>
-      <p:pic>
-        <p:nvPicPr>
-          <p:cNvPr id="48" name="Picture 47"/>
-          <p:cNvPicPr>
-            <a:picLocks noChangeAspect="1"/>
-          </p:cNvPicPr>
+      <p:grpSp>
+        <p:nvGrpSpPr>
+          <p:cNvPr id="47" name="Group 46"/>
+          <p:cNvGrpSpPr/>
           <p:nvPr/>
-        </p:nvPicPr>
-        <p:blipFill>
-          <a:blip r:embed="rId2" cstate="print">
-            <a:extLst>
-              <a:ext uri="{28A0092B-C50C-407E-A947-70E740481C1C}">
-                <a14:useLocalDpi xmlns:a14="http://schemas.microsoft.com/office/drawing/2010/main" val="0"/>
-              </a:ext>
-            </a:extLst>
-          </a:blip>
-          <a:stretch>
-            <a:fillRect/>
-          </a:stretch>
-        </p:blipFill>
-        <p:spPr>
-          <a:xfrm>
-            <a:off x="6725979" y="3136909"/>
-            <a:ext cx="1318202" cy="1250353"/>
-          </a:xfrm>
-          <a:prstGeom prst="rect">
-            <a:avLst/>
-          </a:prstGeom>
-        </p:spPr>
-      </p:pic>
-      <p:pic>
-        <p:nvPicPr>
-          <p:cNvPr id="51" name="Picture 50"/>
-          <p:cNvPicPr>
-            <a:picLocks noChangeAspect="1"/>
-          </p:cNvPicPr>
+        </p:nvGrpSpPr>
+        <p:grpSpPr>
+          <a:xfrm>
+            <a:off x="6753140" y="1046157"/>
+            <a:ext cx="1291041" cy="1219257"/>
+            <a:chOff x="5989247" y="1845961"/>
+            <a:chExt cx="4061994" cy="3940776"/>
+          </a:xfrm>
+          <a:scene3d>
+            <a:camera prst="orthographicFront"/>
+            <a:lightRig rig="chilly" dir="t"/>
+          </a:scene3d>
+        </p:grpSpPr>
+        <p:sp>
+          <p:nvSpPr>
+            <p:cNvPr id="49" name="Oval 48"/>
+            <p:cNvSpPr/>
+            <p:nvPr/>
+          </p:nvSpPr>
+          <p:spPr>
+            <a:xfrm>
+              <a:off x="5989247" y="1845961"/>
+              <a:ext cx="4061994" cy="3940776"/>
+            </a:xfrm>
+            <a:prstGeom prst="ellipse">
+              <a:avLst/>
+            </a:prstGeom>
+            <a:noFill/>
+            <a:ln w="76200">
+              <a:solidFill>
+                <a:schemeClr val="bg2">
+                  <a:lumMod val="75000"/>
+                </a:schemeClr>
+              </a:solidFill>
+            </a:ln>
+            <a:sp3d>
+              <a:bevelT w="152400" h="50800" prst="softRound"/>
+            </a:sp3d>
+          </p:spPr>
+          <p:style>
+            <a:lnRef idx="2">
+              <a:schemeClr val="accent1">
+                <a:shade val="50000"/>
+              </a:schemeClr>
+            </a:lnRef>
+            <a:fillRef idx="1">
+              <a:schemeClr val="accent1"/>
+            </a:fillRef>
+            <a:effectRef idx="0">
+              <a:schemeClr val="accent1"/>
+            </a:effectRef>
+            <a:fontRef idx="minor">
+              <a:schemeClr val="lt1"/>
+            </a:fontRef>
+          </p:style>
+          <p:txBody>
+            <a:bodyPr rtlCol="0" anchor="ctr"/>
+            <a:lstStyle/>
+            <a:p>
+              <a:pPr algn="ctr"/>
+              <a:endParaRPr lang="en-US"/>
+            </a:p>
+          </p:txBody>
+        </p:sp>
+        <p:sp>
+          <p:nvSpPr>
+            <p:cNvPr id="50" name="Isosceles Triangle 49"/>
+            <p:cNvSpPr/>
+            <p:nvPr/>
+          </p:nvSpPr>
+          <p:spPr>
+            <a:xfrm rot="5400000">
+              <a:off x="6863555" y="2911064"/>
+              <a:ext cx="3052772" cy="2035662"/>
+            </a:xfrm>
+            <a:prstGeom prst="triangle">
+              <a:avLst/>
+            </a:prstGeom>
+            <a:solidFill>
+              <a:schemeClr val="bg2">
+                <a:lumMod val="75000"/>
+              </a:schemeClr>
+            </a:solidFill>
+            <a:ln>
+              <a:solidFill>
+                <a:schemeClr val="tx2">
+                  <a:lumMod val="50000"/>
+                </a:schemeClr>
+              </a:solidFill>
+            </a:ln>
+            <a:sp3d>
+              <a:bevelT w="152400" h="50800" prst="softRound"/>
+            </a:sp3d>
+          </p:spPr>
+          <p:style>
+            <a:lnRef idx="2">
+              <a:schemeClr val="accent1">
+                <a:shade val="50000"/>
+              </a:schemeClr>
+            </a:lnRef>
+            <a:fillRef idx="1">
+              <a:schemeClr val="accent1"/>
+            </a:fillRef>
+            <a:effectRef idx="0">
+              <a:schemeClr val="accent1"/>
+            </a:effectRef>
+            <a:fontRef idx="minor">
+              <a:schemeClr val="lt1"/>
+            </a:fontRef>
+          </p:style>
+          <p:txBody>
+            <a:bodyPr rtlCol="0" anchor="ctr"/>
+            <a:lstStyle/>
+            <a:p>
+              <a:pPr algn="ctr"/>
+              <a:endParaRPr lang="en-US"/>
+            </a:p>
+          </p:txBody>
+        </p:sp>
+      </p:grpSp>
+      <p:grpSp>
+        <p:nvGrpSpPr>
+          <p:cNvPr id="58" name="Group 57"/>
+          <p:cNvGrpSpPr/>
           <p:nvPr/>
-        </p:nvPicPr>
-        <p:blipFill>
-          <a:blip r:embed="rId3" cstate="print">
-            <a:extLst>
-              <a:ext uri="{28A0092B-C50C-407E-A947-70E740481C1C}">
-                <a14:useLocalDpi xmlns:a14="http://schemas.microsoft.com/office/drawing/2010/main" val="0"/>
-              </a:ext>
-            </a:extLst>
-          </a:blip>
-          <a:stretch>
-            <a:fillRect/>
-          </a:stretch>
-        </p:blipFill>
-        <p:spPr>
-          <a:xfrm rot="16200000">
-            <a:off x="8192451" y="3419832"/>
-            <a:ext cx="994810" cy="940050"/>
-          </a:xfrm>
-          <a:prstGeom prst="rect">
-            <a:avLst/>
-          </a:prstGeom>
-        </p:spPr>
-      </p:pic>
-      <p:sp>
-        <p:nvSpPr>
-          <p:cNvPr id="52" name="TextBox 51"/>
-          <p:cNvSpPr txBox="1"/>
+        </p:nvGrpSpPr>
+        <p:grpSpPr>
+          <a:xfrm>
+            <a:off x="8219831" y="1177547"/>
+            <a:ext cx="1203544" cy="1112397"/>
+            <a:chOff x="6553517" y="411355"/>
+            <a:chExt cx="3243889" cy="3140877"/>
+          </a:xfrm>
+        </p:grpSpPr>
+        <p:sp>
+          <p:nvSpPr>
+            <p:cNvPr id="59" name="Oval 58"/>
+            <p:cNvSpPr/>
+            <p:nvPr/>
+          </p:nvSpPr>
+          <p:spPr>
+            <a:xfrm>
+              <a:off x="6553517" y="411355"/>
+              <a:ext cx="3243889" cy="3140877"/>
+            </a:xfrm>
+            <a:prstGeom prst="ellipse">
+              <a:avLst/>
+            </a:prstGeom>
+            <a:noFill/>
+            <a:ln w="76200">
+              <a:solidFill>
+                <a:schemeClr val="bg2">
+                  <a:lumMod val="75000"/>
+                </a:schemeClr>
+              </a:solidFill>
+            </a:ln>
+            <a:scene3d>
+              <a:camera prst="orthographicFront"/>
+              <a:lightRig rig="chilly" dir="t"/>
+            </a:scene3d>
+            <a:sp3d>
+              <a:bevelT w="152400" h="50800" prst="softRound"/>
+            </a:sp3d>
+          </p:spPr>
+          <p:style>
+            <a:lnRef idx="2">
+              <a:schemeClr val="accent1">
+                <a:shade val="50000"/>
+              </a:schemeClr>
+            </a:lnRef>
+            <a:fillRef idx="1">
+              <a:schemeClr val="accent1"/>
+            </a:fillRef>
+            <a:effectRef idx="0">
+              <a:schemeClr val="accent1"/>
+            </a:effectRef>
+            <a:fontRef idx="minor">
+              <a:schemeClr val="lt1"/>
+            </a:fontRef>
+          </p:style>
+          <p:txBody>
+            <a:bodyPr rtlCol="0" anchor="ctr"/>
+            <a:lstStyle/>
+            <a:p>
+              <a:pPr algn="ctr"/>
+              <a:endParaRPr lang="en-US"/>
+            </a:p>
+          </p:txBody>
+        </p:sp>
+        <p:sp>
+          <p:nvSpPr>
+            <p:cNvPr id="60" name="Rectangle 59"/>
+            <p:cNvSpPr/>
+            <p:nvPr/>
+          </p:nvSpPr>
+          <p:spPr>
+            <a:xfrm>
+              <a:off x="7366000" y="1174444"/>
+              <a:ext cx="368300" cy="342900"/>
+            </a:xfrm>
+            <a:prstGeom prst="rect">
+              <a:avLst/>
+            </a:prstGeom>
+            <a:solidFill>
+              <a:schemeClr val="bg2">
+                <a:lumMod val="75000"/>
+              </a:schemeClr>
+            </a:solidFill>
+            <a:ln>
+              <a:noFill/>
+            </a:ln>
+            <a:scene3d>
+              <a:camera prst="orthographicFront"/>
+              <a:lightRig rig="threePt" dir="t"/>
+            </a:scene3d>
+            <a:sp3d>
+              <a:bevelT prst="relaxedInset"/>
+            </a:sp3d>
+          </p:spPr>
+          <p:style>
+            <a:lnRef idx="2">
+              <a:schemeClr val="accent1">
+                <a:shade val="50000"/>
+              </a:schemeClr>
+            </a:lnRef>
+            <a:fillRef idx="1">
+              <a:schemeClr val="accent1"/>
+            </a:fillRef>
+            <a:effectRef idx="0">
+              <a:schemeClr val="accent1"/>
+            </a:effectRef>
+            <a:fontRef idx="minor">
+              <a:schemeClr val="lt1"/>
+            </a:fontRef>
+          </p:style>
+          <p:txBody>
+            <a:bodyPr rtlCol="0" anchor="ctr"/>
+            <a:lstStyle/>
+            <a:p>
+              <a:pPr algn="ctr"/>
+              <a:r>
+                <a:rPr lang="en-US" sz="800" dirty="0" smtClean="0"/>
+                <a:t>1</a:t>
+              </a:r>
+              <a:endParaRPr lang="en-US" sz="800" dirty="0"/>
+            </a:p>
+          </p:txBody>
+        </p:sp>
+        <p:sp>
+          <p:nvSpPr>
+            <p:cNvPr id="61" name="Rectangle 60"/>
+            <p:cNvSpPr/>
+            <p:nvPr/>
+          </p:nvSpPr>
+          <p:spPr>
+            <a:xfrm>
+              <a:off x="7807085" y="1174444"/>
+              <a:ext cx="368300" cy="342900"/>
+            </a:xfrm>
+            <a:prstGeom prst="rect">
+              <a:avLst/>
+            </a:prstGeom>
+            <a:solidFill>
+              <a:schemeClr val="bg2">
+                <a:lumMod val="75000"/>
+              </a:schemeClr>
+            </a:solidFill>
+            <a:ln>
+              <a:noFill/>
+            </a:ln>
+            <a:scene3d>
+              <a:camera prst="orthographicFront"/>
+              <a:lightRig rig="threePt" dir="t"/>
+            </a:scene3d>
+            <a:sp3d>
+              <a:bevelT prst="relaxedInset"/>
+            </a:sp3d>
+          </p:spPr>
+          <p:style>
+            <a:lnRef idx="2">
+              <a:schemeClr val="accent1">
+                <a:shade val="50000"/>
+              </a:schemeClr>
+            </a:lnRef>
+            <a:fillRef idx="1">
+              <a:schemeClr val="accent1"/>
+            </a:fillRef>
+            <a:effectRef idx="0">
+              <a:schemeClr val="accent1"/>
+            </a:effectRef>
+            <a:fontRef idx="minor">
+              <a:schemeClr val="lt1"/>
+            </a:fontRef>
+          </p:style>
+          <p:txBody>
+            <a:bodyPr rtlCol="0" anchor="ctr"/>
+            <a:lstStyle/>
+            <a:p>
+              <a:pPr algn="ctr"/>
+              <a:r>
+                <a:rPr lang="en-US" sz="800" dirty="0" smtClean="0"/>
+                <a:t>2</a:t>
+              </a:r>
+              <a:endParaRPr lang="en-US" sz="800" dirty="0"/>
+            </a:p>
+          </p:txBody>
+        </p:sp>
+        <p:sp>
+          <p:nvSpPr>
+            <p:cNvPr id="62" name="Rectangle 61"/>
+            <p:cNvSpPr/>
+            <p:nvPr/>
+          </p:nvSpPr>
+          <p:spPr>
+            <a:xfrm>
+              <a:off x="8228051" y="1174444"/>
+              <a:ext cx="368300" cy="342900"/>
+            </a:xfrm>
+            <a:prstGeom prst="rect">
+              <a:avLst/>
+            </a:prstGeom>
+            <a:solidFill>
+              <a:schemeClr val="bg2">
+                <a:lumMod val="75000"/>
+              </a:schemeClr>
+            </a:solidFill>
+            <a:ln>
+              <a:noFill/>
+            </a:ln>
+            <a:scene3d>
+              <a:camera prst="orthographicFront"/>
+              <a:lightRig rig="threePt" dir="t"/>
+            </a:scene3d>
+            <a:sp3d>
+              <a:bevelT prst="relaxedInset"/>
+            </a:sp3d>
+          </p:spPr>
+          <p:style>
+            <a:lnRef idx="2">
+              <a:schemeClr val="accent1">
+                <a:shade val="50000"/>
+              </a:schemeClr>
+            </a:lnRef>
+            <a:fillRef idx="1">
+              <a:schemeClr val="accent1"/>
+            </a:fillRef>
+            <a:effectRef idx="0">
+              <a:schemeClr val="accent1"/>
+            </a:effectRef>
+            <a:fontRef idx="minor">
+              <a:schemeClr val="lt1"/>
+            </a:fontRef>
+          </p:style>
+          <p:txBody>
+            <a:bodyPr rtlCol="0" anchor="ctr"/>
+            <a:lstStyle/>
+            <a:p>
+              <a:pPr algn="ctr"/>
+              <a:r>
+                <a:rPr lang="en-US" sz="800" dirty="0" smtClean="0"/>
+                <a:t>3</a:t>
+              </a:r>
+              <a:endParaRPr lang="en-US" sz="800" dirty="0"/>
+            </a:p>
+          </p:txBody>
+        </p:sp>
+        <p:sp>
+          <p:nvSpPr>
+            <p:cNvPr id="63" name="Rectangle 62"/>
+            <p:cNvSpPr/>
+            <p:nvPr/>
+          </p:nvSpPr>
+          <p:spPr>
+            <a:xfrm>
+              <a:off x="8649017" y="1174444"/>
+              <a:ext cx="368300" cy="342900"/>
+            </a:xfrm>
+            <a:prstGeom prst="rect">
+              <a:avLst/>
+            </a:prstGeom>
+            <a:solidFill>
+              <a:schemeClr val="bg2">
+                <a:lumMod val="75000"/>
+              </a:schemeClr>
+            </a:solidFill>
+            <a:ln>
+              <a:noFill/>
+            </a:ln>
+            <a:scene3d>
+              <a:camera prst="orthographicFront"/>
+              <a:lightRig rig="threePt" dir="t"/>
+            </a:scene3d>
+            <a:sp3d>
+              <a:bevelT prst="relaxedInset"/>
+            </a:sp3d>
+          </p:spPr>
+          <p:style>
+            <a:lnRef idx="2">
+              <a:schemeClr val="accent1">
+                <a:shade val="50000"/>
+              </a:schemeClr>
+            </a:lnRef>
+            <a:fillRef idx="1">
+              <a:schemeClr val="accent1"/>
+            </a:fillRef>
+            <a:effectRef idx="0">
+              <a:schemeClr val="accent1"/>
+            </a:effectRef>
+            <a:fontRef idx="minor">
+              <a:schemeClr val="lt1"/>
+            </a:fontRef>
+          </p:style>
+          <p:txBody>
+            <a:bodyPr rtlCol="0" anchor="ctr"/>
+            <a:lstStyle/>
+            <a:p>
+              <a:pPr algn="ctr"/>
+              <a:r>
+                <a:rPr lang="en-US" sz="800" dirty="0" smtClean="0"/>
+                <a:t>4</a:t>
+              </a:r>
+              <a:endParaRPr lang="en-US" sz="800" dirty="0"/>
+            </a:p>
+          </p:txBody>
+        </p:sp>
+        <p:sp>
+          <p:nvSpPr>
+            <p:cNvPr id="64" name="Rectangle 63"/>
+            <p:cNvSpPr/>
+            <p:nvPr/>
+          </p:nvSpPr>
+          <p:spPr>
+            <a:xfrm>
+              <a:off x="7366000" y="1620173"/>
+              <a:ext cx="368300" cy="342900"/>
+            </a:xfrm>
+            <a:prstGeom prst="rect">
+              <a:avLst/>
+            </a:prstGeom>
+            <a:solidFill>
+              <a:schemeClr val="bg2">
+                <a:lumMod val="75000"/>
+              </a:schemeClr>
+            </a:solidFill>
+            <a:ln>
+              <a:noFill/>
+            </a:ln>
+            <a:scene3d>
+              <a:camera prst="orthographicFront"/>
+              <a:lightRig rig="threePt" dir="t"/>
+            </a:scene3d>
+            <a:sp3d>
+              <a:bevelT prst="relaxedInset"/>
+            </a:sp3d>
+          </p:spPr>
+          <p:style>
+            <a:lnRef idx="2">
+              <a:schemeClr val="accent1">
+                <a:shade val="50000"/>
+              </a:schemeClr>
+            </a:lnRef>
+            <a:fillRef idx="1">
+              <a:schemeClr val="accent1"/>
+            </a:fillRef>
+            <a:effectRef idx="0">
+              <a:schemeClr val="accent1"/>
+            </a:effectRef>
+            <a:fontRef idx="minor">
+              <a:schemeClr val="lt1"/>
+            </a:fontRef>
+          </p:style>
+          <p:txBody>
+            <a:bodyPr rtlCol="0" anchor="ctr"/>
+            <a:lstStyle/>
+            <a:p>
+              <a:pPr algn="ctr"/>
+              <a:r>
+                <a:rPr lang="en-US" sz="800" dirty="0" smtClean="0"/>
+                <a:t>5</a:t>
+              </a:r>
+              <a:endParaRPr lang="en-US" sz="800" dirty="0"/>
+            </a:p>
+          </p:txBody>
+        </p:sp>
+        <p:sp>
+          <p:nvSpPr>
+            <p:cNvPr id="65" name="Rectangle 64"/>
+            <p:cNvSpPr/>
+            <p:nvPr/>
+          </p:nvSpPr>
+          <p:spPr>
+            <a:xfrm>
+              <a:off x="7791410" y="1620173"/>
+              <a:ext cx="368300" cy="342900"/>
+            </a:xfrm>
+            <a:prstGeom prst="rect">
+              <a:avLst/>
+            </a:prstGeom>
+            <a:solidFill>
+              <a:schemeClr val="bg2">
+                <a:lumMod val="75000"/>
+              </a:schemeClr>
+            </a:solidFill>
+            <a:ln>
+              <a:noFill/>
+            </a:ln>
+            <a:scene3d>
+              <a:camera prst="orthographicFront"/>
+              <a:lightRig rig="threePt" dir="t"/>
+            </a:scene3d>
+            <a:sp3d>
+              <a:bevelT prst="relaxedInset"/>
+            </a:sp3d>
+          </p:spPr>
+          <p:style>
+            <a:lnRef idx="2">
+              <a:schemeClr val="accent1">
+                <a:shade val="50000"/>
+              </a:schemeClr>
+            </a:lnRef>
+            <a:fillRef idx="1">
+              <a:schemeClr val="accent1"/>
+            </a:fillRef>
+            <a:effectRef idx="0">
+              <a:schemeClr val="accent1"/>
+            </a:effectRef>
+            <a:fontRef idx="minor">
+              <a:schemeClr val="lt1"/>
+            </a:fontRef>
+          </p:style>
+          <p:txBody>
+            <a:bodyPr rtlCol="0" anchor="ctr"/>
+            <a:lstStyle/>
+            <a:p>
+              <a:pPr algn="ctr"/>
+              <a:r>
+                <a:rPr lang="en-US" sz="800" dirty="0" smtClean="0"/>
+                <a:t>6</a:t>
+              </a:r>
+              <a:endParaRPr lang="en-US" sz="800" dirty="0"/>
+            </a:p>
+          </p:txBody>
+        </p:sp>
+        <p:sp>
+          <p:nvSpPr>
+            <p:cNvPr id="66" name="Rectangle 65"/>
+            <p:cNvSpPr/>
+            <p:nvPr/>
+          </p:nvSpPr>
+          <p:spPr>
+            <a:xfrm>
+              <a:off x="8229243" y="1623942"/>
+              <a:ext cx="368300" cy="342900"/>
+            </a:xfrm>
+            <a:prstGeom prst="rect">
+              <a:avLst/>
+            </a:prstGeom>
+            <a:solidFill>
+              <a:schemeClr val="bg2">
+                <a:lumMod val="75000"/>
+              </a:schemeClr>
+            </a:solidFill>
+            <a:ln>
+              <a:noFill/>
+            </a:ln>
+            <a:scene3d>
+              <a:camera prst="orthographicFront"/>
+              <a:lightRig rig="threePt" dir="t"/>
+            </a:scene3d>
+            <a:sp3d>
+              <a:bevelT prst="relaxedInset"/>
+            </a:sp3d>
+          </p:spPr>
+          <p:style>
+            <a:lnRef idx="2">
+              <a:schemeClr val="accent1">
+                <a:shade val="50000"/>
+              </a:schemeClr>
+            </a:lnRef>
+            <a:fillRef idx="1">
+              <a:schemeClr val="accent1"/>
+            </a:fillRef>
+            <a:effectRef idx="0">
+              <a:schemeClr val="accent1"/>
+            </a:effectRef>
+            <a:fontRef idx="minor">
+              <a:schemeClr val="lt1"/>
+            </a:fontRef>
+          </p:style>
+          <p:txBody>
+            <a:bodyPr rtlCol="0" anchor="ctr"/>
+            <a:lstStyle/>
+            <a:p>
+              <a:pPr algn="ctr"/>
+              <a:r>
+                <a:rPr lang="en-US" sz="800" dirty="0" smtClean="0"/>
+                <a:t>7</a:t>
+              </a:r>
+              <a:endParaRPr lang="en-US" sz="800" dirty="0"/>
+            </a:p>
+          </p:txBody>
+        </p:sp>
+        <p:sp>
+          <p:nvSpPr>
+            <p:cNvPr id="67" name="Rectangle 66"/>
+            <p:cNvSpPr/>
+            <p:nvPr/>
+          </p:nvSpPr>
+          <p:spPr>
+            <a:xfrm>
+              <a:off x="8656693" y="1618551"/>
+              <a:ext cx="368300" cy="342900"/>
+            </a:xfrm>
+            <a:prstGeom prst="rect">
+              <a:avLst/>
+            </a:prstGeom>
+            <a:solidFill>
+              <a:schemeClr val="bg2">
+                <a:lumMod val="75000"/>
+              </a:schemeClr>
+            </a:solidFill>
+            <a:ln>
+              <a:noFill/>
+            </a:ln>
+            <a:scene3d>
+              <a:camera prst="orthographicFront"/>
+              <a:lightRig rig="threePt" dir="t"/>
+            </a:scene3d>
+            <a:sp3d>
+              <a:bevelT prst="relaxedInset"/>
+            </a:sp3d>
+          </p:spPr>
+          <p:style>
+            <a:lnRef idx="2">
+              <a:schemeClr val="accent1">
+                <a:shade val="50000"/>
+              </a:schemeClr>
+            </a:lnRef>
+            <a:fillRef idx="1">
+              <a:schemeClr val="accent1"/>
+            </a:fillRef>
+            <a:effectRef idx="0">
+              <a:schemeClr val="accent1"/>
+            </a:effectRef>
+            <a:fontRef idx="minor">
+              <a:schemeClr val="lt1"/>
+            </a:fontRef>
+          </p:style>
+          <p:txBody>
+            <a:bodyPr rtlCol="0" anchor="ctr"/>
+            <a:lstStyle/>
+            <a:p>
+              <a:pPr algn="ctr"/>
+              <a:r>
+                <a:rPr lang="en-US" sz="800" dirty="0" smtClean="0"/>
+                <a:t>8</a:t>
+              </a:r>
+              <a:endParaRPr lang="en-US" sz="800" dirty="0"/>
+            </a:p>
+          </p:txBody>
+        </p:sp>
+        <p:sp>
+          <p:nvSpPr>
+            <p:cNvPr id="68" name="Rectangle 67"/>
+            <p:cNvSpPr/>
+            <p:nvPr/>
+          </p:nvSpPr>
+          <p:spPr>
+            <a:xfrm>
+              <a:off x="7366000" y="2065678"/>
+              <a:ext cx="368300" cy="342900"/>
+            </a:xfrm>
+            <a:prstGeom prst="rect">
+              <a:avLst/>
+            </a:prstGeom>
+            <a:solidFill>
+              <a:schemeClr val="bg2">
+                <a:lumMod val="75000"/>
+              </a:schemeClr>
+            </a:solidFill>
+            <a:ln>
+              <a:noFill/>
+            </a:ln>
+            <a:scene3d>
+              <a:camera prst="orthographicFront"/>
+              <a:lightRig rig="threePt" dir="t"/>
+            </a:scene3d>
+            <a:sp3d>
+              <a:bevelT prst="relaxedInset"/>
+            </a:sp3d>
+          </p:spPr>
+          <p:style>
+            <a:lnRef idx="2">
+              <a:schemeClr val="accent1">
+                <a:shade val="50000"/>
+              </a:schemeClr>
+            </a:lnRef>
+            <a:fillRef idx="1">
+              <a:schemeClr val="accent1"/>
+            </a:fillRef>
+            <a:effectRef idx="0">
+              <a:schemeClr val="accent1"/>
+            </a:effectRef>
+            <a:fontRef idx="minor">
+              <a:schemeClr val="lt1"/>
+            </a:fontRef>
+          </p:style>
+          <p:txBody>
+            <a:bodyPr rtlCol="0" anchor="ctr"/>
+            <a:lstStyle/>
+            <a:p>
+              <a:pPr algn="ctr"/>
+              <a:r>
+                <a:rPr lang="en-US" sz="1050" dirty="0" smtClean="0"/>
+                <a:t>8</a:t>
+              </a:r>
+              <a:endParaRPr lang="en-US" sz="1050" dirty="0"/>
+            </a:p>
+          </p:txBody>
+        </p:sp>
+        <p:sp>
+          <p:nvSpPr>
+            <p:cNvPr id="69" name="Rectangle 68"/>
+            <p:cNvSpPr/>
+            <p:nvPr/>
+          </p:nvSpPr>
+          <p:spPr>
+            <a:xfrm>
+              <a:off x="7799285" y="2062658"/>
+              <a:ext cx="368300" cy="342900"/>
+            </a:xfrm>
+            <a:prstGeom prst="rect">
+              <a:avLst/>
+            </a:prstGeom>
+            <a:solidFill>
+              <a:schemeClr val="bg2">
+                <a:lumMod val="75000"/>
+              </a:schemeClr>
+            </a:solidFill>
+            <a:ln>
+              <a:noFill/>
+            </a:ln>
+            <a:scene3d>
+              <a:camera prst="orthographicFront"/>
+              <a:lightRig rig="threePt" dir="t"/>
+            </a:scene3d>
+            <a:sp3d>
+              <a:bevelT prst="relaxedInset"/>
+            </a:sp3d>
+          </p:spPr>
+          <p:style>
+            <a:lnRef idx="2">
+              <a:schemeClr val="accent1">
+                <a:shade val="50000"/>
+              </a:schemeClr>
+            </a:lnRef>
+            <a:fillRef idx="1">
+              <a:schemeClr val="accent1"/>
+            </a:fillRef>
+            <a:effectRef idx="0">
+              <a:schemeClr val="accent1"/>
+            </a:effectRef>
+            <a:fontRef idx="minor">
+              <a:schemeClr val="lt1"/>
+            </a:fontRef>
+          </p:style>
+          <p:txBody>
+            <a:bodyPr rtlCol="0" anchor="ctr"/>
+            <a:lstStyle/>
+            <a:p>
+              <a:pPr algn="ctr"/>
+              <a:r>
+                <a:rPr lang="en-US" sz="1050" dirty="0" smtClean="0"/>
+                <a:t>10</a:t>
+              </a:r>
+              <a:endParaRPr lang="en-US" sz="1050" dirty="0"/>
+            </a:p>
+          </p:txBody>
+        </p:sp>
+        <p:sp>
+          <p:nvSpPr>
+            <p:cNvPr id="70" name="Rectangle 69"/>
+            <p:cNvSpPr/>
+            <p:nvPr/>
+          </p:nvSpPr>
+          <p:spPr>
+            <a:xfrm>
+              <a:off x="8237257" y="2067688"/>
+              <a:ext cx="368300" cy="342900"/>
+            </a:xfrm>
+            <a:prstGeom prst="rect">
+              <a:avLst/>
+            </a:prstGeom>
+            <a:solidFill>
+              <a:schemeClr val="bg2">
+                <a:lumMod val="75000"/>
+              </a:schemeClr>
+            </a:solidFill>
+            <a:ln>
+              <a:noFill/>
+            </a:ln>
+            <a:scene3d>
+              <a:camera prst="orthographicFront"/>
+              <a:lightRig rig="threePt" dir="t"/>
+            </a:scene3d>
+            <a:sp3d>
+              <a:bevelT prst="relaxedInset"/>
+            </a:sp3d>
+          </p:spPr>
+          <p:style>
+            <a:lnRef idx="2">
+              <a:schemeClr val="accent1">
+                <a:shade val="50000"/>
+              </a:schemeClr>
+            </a:lnRef>
+            <a:fillRef idx="1">
+              <a:schemeClr val="accent1"/>
+            </a:fillRef>
+            <a:effectRef idx="0">
+              <a:schemeClr val="accent1"/>
+            </a:effectRef>
+            <a:fontRef idx="minor">
+              <a:schemeClr val="lt1"/>
+            </a:fontRef>
+          </p:style>
+          <p:txBody>
+            <a:bodyPr rtlCol="0" anchor="ctr"/>
+            <a:lstStyle/>
+            <a:p>
+              <a:pPr algn="ctr"/>
+              <a:r>
+                <a:rPr lang="en-US" sz="1050" dirty="0" smtClean="0"/>
+                <a:t>11</a:t>
+              </a:r>
+              <a:endParaRPr lang="en-US" sz="1050" dirty="0"/>
+            </a:p>
+          </p:txBody>
+        </p:sp>
+        <p:sp>
+          <p:nvSpPr>
+            <p:cNvPr id="71" name="Rectangle 70"/>
+            <p:cNvSpPr/>
+            <p:nvPr/>
+          </p:nvSpPr>
+          <p:spPr>
+            <a:xfrm>
+              <a:off x="8656693" y="2062658"/>
+              <a:ext cx="368300" cy="342900"/>
+            </a:xfrm>
+            <a:prstGeom prst="rect">
+              <a:avLst/>
+            </a:prstGeom>
+            <a:solidFill>
+              <a:schemeClr val="bg2">
+                <a:lumMod val="75000"/>
+              </a:schemeClr>
+            </a:solidFill>
+            <a:ln>
+              <a:noFill/>
+            </a:ln>
+            <a:scene3d>
+              <a:camera prst="orthographicFront"/>
+              <a:lightRig rig="threePt" dir="t"/>
+            </a:scene3d>
+            <a:sp3d>
+              <a:bevelT prst="relaxedInset"/>
+            </a:sp3d>
+          </p:spPr>
+          <p:style>
+            <a:lnRef idx="2">
+              <a:schemeClr val="accent1">
+                <a:shade val="50000"/>
+              </a:schemeClr>
+            </a:lnRef>
+            <a:fillRef idx="1">
+              <a:schemeClr val="accent1"/>
+            </a:fillRef>
+            <a:effectRef idx="0">
+              <a:schemeClr val="accent1"/>
+            </a:effectRef>
+            <a:fontRef idx="minor">
+              <a:schemeClr val="lt1"/>
+            </a:fontRef>
+          </p:style>
+          <p:txBody>
+            <a:bodyPr rtlCol="0" anchor="ctr"/>
+            <a:lstStyle/>
+            <a:p>
+              <a:pPr algn="ctr"/>
+              <a:r>
+                <a:rPr lang="en-US" sz="1050" dirty="0" smtClean="0"/>
+                <a:t>12</a:t>
+              </a:r>
+              <a:endParaRPr lang="en-US" sz="1050" dirty="0"/>
+            </a:p>
+          </p:txBody>
+        </p:sp>
+        <p:sp>
+          <p:nvSpPr>
+            <p:cNvPr id="72" name="Rectangle 71"/>
+            <p:cNvSpPr/>
+            <p:nvPr/>
+          </p:nvSpPr>
+          <p:spPr>
+            <a:xfrm>
+              <a:off x="7366000" y="2511183"/>
+              <a:ext cx="368300" cy="342900"/>
+            </a:xfrm>
+            <a:prstGeom prst="rect">
+              <a:avLst/>
+            </a:prstGeom>
+            <a:solidFill>
+              <a:schemeClr val="bg2">
+                <a:lumMod val="75000"/>
+              </a:schemeClr>
+            </a:solidFill>
+            <a:ln>
+              <a:noFill/>
+            </a:ln>
+            <a:scene3d>
+              <a:camera prst="orthographicFront"/>
+              <a:lightRig rig="threePt" dir="t"/>
+            </a:scene3d>
+            <a:sp3d>
+              <a:bevelT prst="relaxedInset"/>
+            </a:sp3d>
+          </p:spPr>
+          <p:style>
+            <a:lnRef idx="2">
+              <a:schemeClr val="accent1">
+                <a:shade val="50000"/>
+              </a:schemeClr>
+            </a:lnRef>
+            <a:fillRef idx="1">
+              <a:schemeClr val="accent1"/>
+            </a:fillRef>
+            <a:effectRef idx="0">
+              <a:schemeClr val="accent1"/>
+            </a:effectRef>
+            <a:fontRef idx="minor">
+              <a:schemeClr val="lt1"/>
+            </a:fontRef>
+          </p:style>
+          <p:txBody>
+            <a:bodyPr rtlCol="0" anchor="ctr"/>
+            <a:lstStyle/>
+            <a:p>
+              <a:pPr algn="ctr"/>
+              <a:r>
+                <a:rPr lang="en-US" sz="800" dirty="0" smtClean="0"/>
+                <a:t>13</a:t>
+              </a:r>
+              <a:endParaRPr lang="en-US" sz="800" dirty="0"/>
+            </a:p>
+          </p:txBody>
+        </p:sp>
+        <p:sp>
+          <p:nvSpPr>
+            <p:cNvPr id="73" name="Rectangle 72"/>
+            <p:cNvSpPr/>
+            <p:nvPr/>
+          </p:nvSpPr>
+          <p:spPr>
+            <a:xfrm>
+              <a:off x="7805131" y="2511183"/>
+              <a:ext cx="368300" cy="342900"/>
+            </a:xfrm>
+            <a:prstGeom prst="rect">
+              <a:avLst/>
+            </a:prstGeom>
+            <a:solidFill>
+              <a:schemeClr val="bg2">
+                <a:lumMod val="75000"/>
+              </a:schemeClr>
+            </a:solidFill>
+            <a:ln>
+              <a:noFill/>
+            </a:ln>
+            <a:scene3d>
+              <a:camera prst="orthographicFront"/>
+              <a:lightRig rig="threePt" dir="t"/>
+            </a:scene3d>
+            <a:sp3d>
+              <a:bevelT prst="relaxedInset"/>
+            </a:sp3d>
+          </p:spPr>
+          <p:style>
+            <a:lnRef idx="2">
+              <a:schemeClr val="accent1">
+                <a:shade val="50000"/>
+              </a:schemeClr>
+            </a:lnRef>
+            <a:fillRef idx="1">
+              <a:schemeClr val="accent1"/>
+            </a:fillRef>
+            <a:effectRef idx="0">
+              <a:schemeClr val="accent1"/>
+            </a:effectRef>
+            <a:fontRef idx="minor">
+              <a:schemeClr val="lt1"/>
+            </a:fontRef>
+          </p:style>
+          <p:txBody>
+            <a:bodyPr rtlCol="0" anchor="ctr"/>
+            <a:lstStyle/>
+            <a:p>
+              <a:pPr algn="ctr"/>
+              <a:r>
+                <a:rPr lang="en-US" sz="800" dirty="0" smtClean="0"/>
+                <a:t>14</a:t>
+              </a:r>
+              <a:endParaRPr lang="en-US" sz="800" dirty="0"/>
+            </a:p>
+          </p:txBody>
+        </p:sp>
+        <p:sp>
+          <p:nvSpPr>
+            <p:cNvPr id="74" name="Rectangle 73"/>
+            <p:cNvSpPr/>
+            <p:nvPr/>
+          </p:nvSpPr>
+          <p:spPr>
+            <a:xfrm>
+              <a:off x="8231869" y="2511183"/>
+              <a:ext cx="368300" cy="342900"/>
+            </a:xfrm>
+            <a:prstGeom prst="rect">
+              <a:avLst/>
+            </a:prstGeom>
+            <a:solidFill>
+              <a:schemeClr val="bg2">
+                <a:lumMod val="75000"/>
+              </a:schemeClr>
+            </a:solidFill>
+            <a:ln>
+              <a:noFill/>
+            </a:ln>
+            <a:scene3d>
+              <a:camera prst="orthographicFront"/>
+              <a:lightRig rig="threePt" dir="t"/>
+            </a:scene3d>
+            <a:sp3d>
+              <a:bevelT prst="relaxedInset"/>
+            </a:sp3d>
+          </p:spPr>
+          <p:style>
+            <a:lnRef idx="2">
+              <a:schemeClr val="accent1">
+                <a:shade val="50000"/>
+              </a:schemeClr>
+            </a:lnRef>
+            <a:fillRef idx="1">
+              <a:schemeClr val="accent1"/>
+            </a:fillRef>
+            <a:effectRef idx="0">
+              <a:schemeClr val="accent1"/>
+            </a:effectRef>
+            <a:fontRef idx="minor">
+              <a:schemeClr val="lt1"/>
+            </a:fontRef>
+          </p:style>
+          <p:txBody>
+            <a:bodyPr rtlCol="0" anchor="ctr"/>
+            <a:lstStyle/>
+            <a:p>
+              <a:pPr algn="ctr"/>
+              <a:r>
+                <a:rPr lang="en-US" sz="800" dirty="0" smtClean="0"/>
+                <a:t>15</a:t>
+              </a:r>
+              <a:endParaRPr lang="en-US" sz="800" dirty="0"/>
+            </a:p>
+          </p:txBody>
+        </p:sp>
+      </p:grpSp>
+      <p:grpSp>
+        <p:nvGrpSpPr>
+          <p:cNvPr id="75" name="Group 74"/>
+          <p:cNvGrpSpPr/>
           <p:nvPr/>
-        </p:nvSpPr>
-        <p:spPr>
-          <a:xfrm>
-            <a:off x="2555362" y="2991627"/>
-            <a:ext cx="1760739" cy="646331"/>
-          </a:xfrm>
-          <a:prstGeom prst="rect">
-            <a:avLst/>
-          </a:prstGeom>
-          <a:noFill/>
-        </p:spPr>
-        <p:txBody>
-          <a:bodyPr wrap="square" rtlCol="0">
-            <a:spAutoFit/>
-          </a:bodyPr>
-          <a:lstStyle/>
-          <a:p>
-            <a:r>
-              <a:rPr lang="en-US" sz="3600" dirty="0" smtClean="0"/>
-              <a:t>PAT 1</a:t>
-            </a:r>
-            <a:endParaRPr lang="en-US" sz="3600" dirty="0"/>
-          </a:p>
-        </p:txBody>
-      </p:sp>
-      <p:sp>
-        <p:nvSpPr>
-          <p:cNvPr id="53" name="TextBox 52"/>
-          <p:cNvSpPr txBox="1"/>
+        </p:nvGrpSpPr>
+        <p:grpSpPr>
+          <a:xfrm>
+            <a:off x="83144" y="2250090"/>
+            <a:ext cx="1621945" cy="1565496"/>
+            <a:chOff x="2398852" y="622135"/>
+            <a:chExt cx="3243889" cy="3140877"/>
+          </a:xfrm>
+        </p:grpSpPr>
+        <p:sp>
+          <p:nvSpPr>
+            <p:cNvPr id="76" name="Right Arrow 75"/>
+            <p:cNvSpPr/>
+            <p:nvPr/>
+          </p:nvSpPr>
+          <p:spPr>
+            <a:xfrm rot="10800000">
+              <a:off x="2877484" y="1005752"/>
+              <a:ext cx="2145729" cy="2429568"/>
+            </a:xfrm>
+            <a:prstGeom prst="rightArrow">
+              <a:avLst/>
+            </a:prstGeom>
+            <a:solidFill>
+              <a:schemeClr val="bg2">
+                <a:lumMod val="75000"/>
+              </a:schemeClr>
+            </a:solidFill>
+            <a:scene3d>
+              <a:camera prst="orthographicFront"/>
+              <a:lightRig rig="chilly" dir="t"/>
+            </a:scene3d>
+            <a:sp3d>
+              <a:bevelT w="152400" h="50800" prst="softRound"/>
+            </a:sp3d>
+          </p:spPr>
+          <p:style>
+            <a:lnRef idx="2">
+              <a:schemeClr val="accent1">
+                <a:shade val="50000"/>
+              </a:schemeClr>
+            </a:lnRef>
+            <a:fillRef idx="1">
+              <a:schemeClr val="accent1"/>
+            </a:fillRef>
+            <a:effectRef idx="0">
+              <a:schemeClr val="accent1"/>
+            </a:effectRef>
+            <a:fontRef idx="minor">
+              <a:schemeClr val="lt1"/>
+            </a:fontRef>
+          </p:style>
+          <p:txBody>
+            <a:bodyPr rtlCol="0" anchor="ctr"/>
+            <a:lstStyle/>
+            <a:p>
+              <a:pPr algn="ctr"/>
+              <a:endParaRPr lang="en-US"/>
+            </a:p>
+          </p:txBody>
+        </p:sp>
+        <p:sp>
+          <p:nvSpPr>
+            <p:cNvPr id="77" name="Oval 76"/>
+            <p:cNvSpPr/>
+            <p:nvPr/>
+          </p:nvSpPr>
+          <p:spPr>
+            <a:xfrm>
+              <a:off x="2398852" y="622135"/>
+              <a:ext cx="3243889" cy="3140877"/>
+            </a:xfrm>
+            <a:prstGeom prst="ellipse">
+              <a:avLst/>
+            </a:prstGeom>
+            <a:noFill/>
+            <a:ln w="76200">
+              <a:solidFill>
+                <a:schemeClr val="bg2">
+                  <a:lumMod val="75000"/>
+                </a:schemeClr>
+              </a:solidFill>
+            </a:ln>
+            <a:scene3d>
+              <a:camera prst="orthographicFront"/>
+              <a:lightRig rig="chilly" dir="t"/>
+            </a:scene3d>
+            <a:sp3d>
+              <a:bevelT w="152400" h="50800" prst="softRound"/>
+            </a:sp3d>
+          </p:spPr>
+          <p:style>
+            <a:lnRef idx="2">
+              <a:schemeClr val="accent1">
+                <a:shade val="50000"/>
+              </a:schemeClr>
+            </a:lnRef>
+            <a:fillRef idx="1">
+              <a:schemeClr val="accent1"/>
+            </a:fillRef>
+            <a:effectRef idx="0">
+              <a:schemeClr val="accent1"/>
+            </a:effectRef>
+            <a:fontRef idx="minor">
+              <a:schemeClr val="lt1"/>
+            </a:fontRef>
+          </p:style>
+          <p:txBody>
+            <a:bodyPr rtlCol="0" anchor="ctr"/>
+            <a:lstStyle/>
+            <a:p>
+              <a:pPr algn="ctr"/>
+              <a:endParaRPr lang="en-US"/>
+            </a:p>
+          </p:txBody>
+        </p:sp>
+      </p:grpSp>
+      <p:grpSp>
+        <p:nvGrpSpPr>
+          <p:cNvPr id="78" name="Group 77"/>
+          <p:cNvGrpSpPr/>
           <p:nvPr/>
-        </p:nvSpPr>
-        <p:spPr>
-          <a:xfrm>
-            <a:off x="2555362" y="3608303"/>
-            <a:ext cx="3203421" cy="461665"/>
-          </a:xfrm>
-          <a:prstGeom prst="rect">
-            <a:avLst/>
-          </a:prstGeom>
-          <a:noFill/>
-        </p:spPr>
-        <p:txBody>
-          <a:bodyPr wrap="square" rtlCol="0">
-            <a:spAutoFit/>
-          </a:bodyPr>
-          <a:lstStyle/>
-          <a:p>
-            <a:r>
-              <a:rPr lang="en-US" sz="2400" dirty="0" smtClean="0"/>
-              <a:t>Time:                 00:00:0.0</a:t>
-            </a:r>
-            <a:endParaRPr lang="en-US" sz="2400" dirty="0"/>
-          </a:p>
-        </p:txBody>
-      </p:sp>
-      <p:sp>
-        <p:nvSpPr>
-          <p:cNvPr id="54" name="TextBox 53"/>
-          <p:cNvSpPr txBox="1"/>
-          <p:nvPr/>
-        </p:nvSpPr>
-        <p:spPr>
-          <a:xfrm>
-            <a:off x="2555363" y="4048556"/>
-            <a:ext cx="3203421" cy="461665"/>
-          </a:xfrm>
-          <a:prstGeom prst="rect">
-            <a:avLst/>
-          </a:prstGeom>
-          <a:noFill/>
-        </p:spPr>
-        <p:txBody>
-          <a:bodyPr wrap="square" rtlCol="0">
-            <a:spAutoFit/>
-          </a:bodyPr>
-          <a:lstStyle/>
-          <a:p>
-            <a:r>
-              <a:rPr lang="en-US" sz="2400" dirty="0" smtClean="0"/>
-              <a:t>Moves:              0</a:t>
-            </a:r>
-            <a:endParaRPr lang="en-US" sz="2400" dirty="0"/>
-          </a:p>
-        </p:txBody>
-      </p:sp>
-      <p:pic>
-        <p:nvPicPr>
-          <p:cNvPr id="55" name="Picture 54"/>
-          <p:cNvPicPr>
-            <a:picLocks noChangeAspect="1"/>
-          </p:cNvPicPr>
-          <p:nvPr/>
-        </p:nvPicPr>
-        <p:blipFill>
-          <a:blip r:embed="rId4" cstate="print">
-            <a:extLst>
-              <a:ext uri="{28A0092B-C50C-407E-A947-70E740481C1C}">
-                <a14:useLocalDpi xmlns:a14="http://schemas.microsoft.com/office/drawing/2010/main" val="0"/>
-              </a:ext>
-            </a:extLst>
-          </a:blip>
-          <a:stretch>
-            <a:fillRect/>
-          </a:stretch>
-        </p:blipFill>
-        <p:spPr>
-          <a:xfrm>
-            <a:off x="5091719" y="5184041"/>
-            <a:ext cx="1477768" cy="1491823"/>
-          </a:xfrm>
-          <a:prstGeom prst="rect">
-            <a:avLst/>
-          </a:prstGeom>
-        </p:spPr>
-      </p:pic>
-      <p:sp>
-        <p:nvSpPr>
-          <p:cNvPr id="56" name="Rounded Rectangle 55"/>
-          <p:cNvSpPr/>
-          <p:nvPr/>
-        </p:nvSpPr>
-        <p:spPr>
-          <a:xfrm>
-            <a:off x="2336799" y="888820"/>
-            <a:ext cx="7300911" cy="1599507"/>
-          </a:xfrm>
-          <a:prstGeom prst="roundRect">
-            <a:avLst>
-              <a:gd name="adj" fmla="val 6345"/>
-            </a:avLst>
-          </a:prstGeom>
-          <a:noFill/>
-          <a:ln w="57150">
+        </p:nvGrpSpPr>
+        <p:grpSpPr>
+          <a:xfrm rot="10800000">
+            <a:off x="10264229" y="2166209"/>
+            <a:ext cx="1621945" cy="1565496"/>
+            <a:chOff x="2398852" y="622135"/>
+            <a:chExt cx="3243889" cy="3140877"/>
+          </a:xfrm>
+        </p:grpSpPr>
+        <p:sp>
+          <p:nvSpPr>
+            <p:cNvPr id="79" name="Right Arrow 78"/>
+            <p:cNvSpPr/>
+            <p:nvPr/>
+          </p:nvSpPr>
+          <p:spPr>
+            <a:xfrm rot="10800000">
+              <a:off x="2877484" y="1005752"/>
+              <a:ext cx="2145729" cy="2429568"/>
+            </a:xfrm>
+            <a:prstGeom prst="rightArrow">
+              <a:avLst/>
+            </a:prstGeom>
             <a:solidFill>
-              <a:schemeClr val="tx1"/>
+              <a:schemeClr val="bg2">
+                <a:lumMod val="75000"/>
+              </a:schemeClr>
             </a:solidFill>
-          </a:ln>
-        </p:spPr>
-        <p:style>
-          <a:lnRef idx="2">
-            <a:schemeClr val="accent1">
-              <a:shade val="50000"/>
-            </a:schemeClr>
-          </a:lnRef>
-          <a:fillRef idx="1">
-            <a:schemeClr val="accent1"/>
-          </a:fillRef>
-          <a:effectRef idx="0">
-            <a:schemeClr val="accent1"/>
-          </a:effectRef>
-          <a:fontRef idx="minor">
-            <a:schemeClr val="lt1"/>
-          </a:fontRef>
-        </p:style>
-        <p:txBody>
-          <a:bodyPr rtlCol="0" anchor="ctr"/>
-          <a:lstStyle/>
-          <a:p>
-            <a:pPr algn="ctr"/>
-            <a:endParaRPr lang="en-US"/>
-          </a:p>
-        </p:txBody>
-      </p:sp>
-      <p:sp>
-        <p:nvSpPr>
-          <p:cNvPr id="57" name="Rounded Rectangle 56"/>
-          <p:cNvSpPr/>
-          <p:nvPr/>
-        </p:nvSpPr>
-        <p:spPr>
-          <a:xfrm>
-            <a:off x="2336799" y="2991627"/>
-            <a:ext cx="7300911" cy="1599507"/>
-          </a:xfrm>
-          <a:prstGeom prst="roundRect">
-            <a:avLst>
-              <a:gd name="adj" fmla="val 6345"/>
-            </a:avLst>
-          </a:prstGeom>
-          <a:noFill/>
-          <a:ln w="57150">
-            <a:solidFill>
-              <a:schemeClr val="tx1"/>
-            </a:solidFill>
-          </a:ln>
-        </p:spPr>
-        <p:style>
-          <a:lnRef idx="2">
-            <a:schemeClr val="accent1">
-              <a:shade val="50000"/>
-            </a:schemeClr>
-          </a:lnRef>
-          <a:fillRef idx="1">
-            <a:schemeClr val="accent1"/>
-          </a:fillRef>
-          <a:effectRef idx="0">
-            <a:schemeClr val="accent1"/>
-          </a:effectRef>
-          <a:fontRef idx="minor">
-            <a:schemeClr val="lt1"/>
-          </a:fontRef>
-        </p:style>
-        <p:txBody>
-          <a:bodyPr rtlCol="0" anchor="ctr"/>
-          <a:lstStyle/>
-          <a:p>
-            <a:pPr algn="ctr"/>
-            <a:endParaRPr lang="en-US"/>
-          </a:p>
-        </p:txBody>
-      </p:sp>
+            <a:scene3d>
+              <a:camera prst="orthographicFront"/>
+              <a:lightRig rig="chilly" dir="t"/>
+            </a:scene3d>
+            <a:sp3d>
+              <a:bevelT w="152400" h="50800" prst="softRound"/>
+            </a:sp3d>
+          </p:spPr>
+          <p:style>
+            <a:lnRef idx="2">
+              <a:schemeClr val="accent1">
+                <a:shade val="50000"/>
+              </a:schemeClr>
+            </a:lnRef>
+            <a:fillRef idx="1">
+              <a:schemeClr val="accent1"/>
+            </a:fillRef>
+            <a:effectRef idx="0">
+              <a:schemeClr val="accent1"/>
+            </a:effectRef>
+            <a:fontRef idx="minor">
+              <a:schemeClr val="lt1"/>
+            </a:fontRef>
+          </p:style>
+          <p:txBody>
+            <a:bodyPr rtlCol="0" anchor="ctr"/>
+            <a:lstStyle/>
+            <a:p>
+              <a:pPr algn="ctr"/>
+              <a:endParaRPr lang="en-US"/>
+            </a:p>
+          </p:txBody>
+        </p:sp>
+        <p:sp>
+          <p:nvSpPr>
+            <p:cNvPr id="80" name="Oval 79"/>
+            <p:cNvSpPr/>
+            <p:nvPr/>
+          </p:nvSpPr>
+          <p:spPr>
+            <a:xfrm>
+              <a:off x="2398852" y="622135"/>
+              <a:ext cx="3243889" cy="3140877"/>
+            </a:xfrm>
+            <a:prstGeom prst="ellipse">
+              <a:avLst/>
+            </a:prstGeom>
+            <a:noFill/>
+            <a:ln w="76200">
+              <a:solidFill>
+                <a:schemeClr val="bg2">
+                  <a:lumMod val="75000"/>
+                </a:schemeClr>
+              </a:solidFill>
+            </a:ln>
+            <a:scene3d>
+              <a:camera prst="orthographicFront"/>
+              <a:lightRig rig="chilly" dir="t"/>
+            </a:scene3d>
+            <a:sp3d>
+              <a:bevelT w="152400" h="50800" prst="softRound"/>
+            </a:sp3d>
+          </p:spPr>
+          <p:style>
+            <a:lnRef idx="2">
+              <a:schemeClr val="accent1">
+                <a:shade val="50000"/>
+              </a:schemeClr>
+            </a:lnRef>
+            <a:fillRef idx="1">
+              <a:schemeClr val="accent1"/>
+            </a:fillRef>
+            <a:effectRef idx="0">
+              <a:schemeClr val="accent1"/>
+            </a:effectRef>
+            <a:fontRef idx="minor">
+              <a:schemeClr val="lt1"/>
+            </a:fontRef>
+          </p:style>
+          <p:txBody>
+            <a:bodyPr rtlCol="0" anchor="ctr"/>
+            <a:lstStyle/>
+            <a:p>
+              <a:pPr algn="ctr"/>
+              <a:endParaRPr lang="en-US"/>
+            </a:p>
+          </p:txBody>
+        </p:sp>
+      </p:grpSp>
     </p:spTree>
     <p:extLst>
       <p:ext uri="{BB962C8B-B14F-4D97-AF65-F5344CB8AC3E}">
@@ -5907,71 +6880,46 @@
       </p:grpSpPr>
       <p:sp>
         <p:nvSpPr>
-          <p:cNvPr id="30" name="Rectangle 29"/>
+          <p:cNvPr id="31" name="Rounded Rectangle 30"/>
           <p:cNvSpPr/>
           <p:nvPr/>
         </p:nvSpPr>
         <p:spPr>
           <a:xfrm>
-            <a:off x="-1694533" y="-1050196"/>
-            <a:ext cx="16555452" cy="10154653"/>
-          </a:xfrm>
-          <a:prstGeom prst="rect">
-            <a:avLst/>
-          </a:prstGeom>
-          <a:ln>
-            <a:noFill/>
-          </a:ln>
-        </p:spPr>
-        <p:style>
-          <a:lnRef idx="2">
-            <a:schemeClr val="dk1">
-              <a:shade val="50000"/>
-            </a:schemeClr>
-          </a:lnRef>
-          <a:fillRef idx="1">
-            <a:schemeClr val="dk1"/>
-          </a:fillRef>
-          <a:effectRef idx="0">
-            <a:schemeClr val="dk1"/>
-          </a:effectRef>
-          <a:fontRef idx="minor">
-            <a:schemeClr val="lt1"/>
-          </a:fontRef>
-        </p:style>
-        <p:txBody>
-          <a:bodyPr rtlCol="0" anchor="ctr"/>
-          <a:lstStyle/>
-          <a:p>
-            <a:pPr algn="ctr"/>
-            <a:endParaRPr lang="en-US"/>
-          </a:p>
-        </p:txBody>
-      </p:sp>
-      <p:sp>
-        <p:nvSpPr>
-          <p:cNvPr id="29" name="Rounded Rectangle 28"/>
-          <p:cNvSpPr>
-            <a:spLocks/>
-          </p:cNvSpPr>
-          <p:nvPr/>
-        </p:nvSpPr>
-        <p:spPr>
-          <a:xfrm>
-            <a:off x="-1273428" y="5086133"/>
-            <a:ext cx="15713243" cy="3688398"/>
+            <a:off x="112408" y="3813376"/>
+            <a:ext cx="11946242" cy="2698767"/>
           </a:xfrm>
           <a:prstGeom prst="roundRect">
             <a:avLst>
-              <a:gd name="adj" fmla="val 6345"/>
+              <a:gd name="adj" fmla="val 13890"/>
             </a:avLst>
           </a:prstGeom>
-          <a:noFill/>
-          <a:ln w="88900" cmpd="sng">
+          <a:pattFill prst="pct5">
+            <a:fgClr>
+              <a:schemeClr val="tx2">
+                <a:lumMod val="50000"/>
+              </a:schemeClr>
+            </a:fgClr>
+            <a:bgClr>
+              <a:schemeClr val="bg1">
+                <a:lumMod val="95000"/>
+                <a:lumOff val="5000"/>
+              </a:schemeClr>
+            </a:bgClr>
+          </a:pattFill>
+          <a:ln w="76200">
             <a:solidFill>
-              <a:schemeClr val="tx1"/>
+              <a:schemeClr val="tx1">
+                <a:alpha val="82000"/>
+              </a:schemeClr>
             </a:solidFill>
           </a:ln>
+          <a:effectLst>
+            <a:innerShdw blurRad="114300">
+              <a:prstClr val="black"/>
+            </a:innerShdw>
+            <a:softEdge rad="63500"/>
+          </a:effectLst>
         </p:spPr>
         <p:style>
           <a:lnRef idx="2">
@@ -5998,984 +6946,6 @@
           </a:p>
         </p:txBody>
       </p:sp>
-      <p:sp>
-        <p:nvSpPr>
-          <p:cNvPr id="32" name="Isosceles Triangle 31"/>
-          <p:cNvSpPr/>
-          <p:nvPr/>
-        </p:nvSpPr>
-        <p:spPr>
-          <a:xfrm rot="16200000">
-            <a:off x="2705953" y="1324670"/>
-            <a:ext cx="2450451" cy="1463932"/>
-          </a:xfrm>
-          <a:prstGeom prst="triangle">
-            <a:avLst>
-              <a:gd name="adj" fmla="val 46889"/>
-            </a:avLst>
-          </a:prstGeom>
-          <a:solidFill>
-            <a:schemeClr val="tx1"/>
-          </a:solidFill>
-          <a:ln>
-            <a:noFill/>
-          </a:ln>
-        </p:spPr>
-        <p:style>
-          <a:lnRef idx="2">
-            <a:schemeClr val="accent1">
-              <a:shade val="50000"/>
-            </a:schemeClr>
-          </a:lnRef>
-          <a:fillRef idx="1">
-            <a:schemeClr val="accent1"/>
-          </a:fillRef>
-          <a:effectRef idx="0">
-            <a:schemeClr val="accent1"/>
-          </a:effectRef>
-          <a:fontRef idx="minor">
-            <a:schemeClr val="lt1"/>
-          </a:fontRef>
-        </p:style>
-        <p:txBody>
-          <a:bodyPr rtlCol="0" anchor="ctr"/>
-          <a:lstStyle/>
-          <a:p>
-            <a:pPr algn="ctr"/>
-            <a:endParaRPr lang="en-US"/>
-          </a:p>
-        </p:txBody>
-      </p:sp>
-      <p:grpSp>
-        <p:nvGrpSpPr>
-          <p:cNvPr id="67" name="Group 66"/>
-          <p:cNvGrpSpPr/>
-          <p:nvPr/>
-        </p:nvGrpSpPr>
-        <p:grpSpPr>
-          <a:xfrm>
-            <a:off x="6944561" y="691371"/>
-            <a:ext cx="2818970" cy="2776367"/>
-            <a:chOff x="4216371" y="139614"/>
-            <a:chExt cx="3373394" cy="3323967"/>
-          </a:xfrm>
-        </p:grpSpPr>
-        <p:sp>
-          <p:nvSpPr>
-            <p:cNvPr id="42" name="Rectangle 41"/>
-            <p:cNvSpPr/>
-            <p:nvPr/>
-          </p:nvSpPr>
-          <p:spPr>
-            <a:xfrm>
-              <a:off x="4834048" y="1349573"/>
-              <a:ext cx="460007" cy="414227"/>
-            </a:xfrm>
-            <a:prstGeom prst="rect">
-              <a:avLst/>
-            </a:prstGeom>
-            <a:solidFill>
-              <a:schemeClr val="tx1"/>
-            </a:solidFill>
-            <a:ln>
-              <a:noFill/>
-            </a:ln>
-          </p:spPr>
-          <p:style>
-            <a:lnRef idx="2">
-              <a:schemeClr val="accent1">
-                <a:shade val="50000"/>
-              </a:schemeClr>
-            </a:lnRef>
-            <a:fillRef idx="1">
-              <a:schemeClr val="accent1"/>
-            </a:fillRef>
-            <a:effectRef idx="0">
-              <a:schemeClr val="accent1"/>
-            </a:effectRef>
-            <a:fontRef idx="minor">
-              <a:schemeClr val="lt1"/>
-            </a:fontRef>
-          </p:style>
-          <p:txBody>
-            <a:bodyPr rtlCol="0" anchor="ctr"/>
-            <a:lstStyle/>
-            <a:p>
-              <a:pPr algn="ctr"/>
-              <a:r>
-                <a:rPr lang="en-US" dirty="0" smtClean="0"/>
-                <a:t>x</a:t>
-              </a:r>
-              <a:endParaRPr lang="en-US" dirty="0"/>
-            </a:p>
-          </p:txBody>
-        </p:sp>
-        <p:sp>
-          <p:nvSpPr>
-            <p:cNvPr id="48" name="Oval 47"/>
-            <p:cNvSpPr/>
-            <p:nvPr/>
-          </p:nvSpPr>
-          <p:spPr>
-            <a:xfrm>
-              <a:off x="4216371" y="139614"/>
-              <a:ext cx="3373394" cy="3323967"/>
-            </a:xfrm>
-            <a:prstGeom prst="ellipse">
-              <a:avLst/>
-            </a:prstGeom>
-            <a:noFill/>
-            <a:ln w="76200">
-              <a:solidFill>
-                <a:schemeClr val="tx1">
-                  <a:lumMod val="95000"/>
-                </a:schemeClr>
-              </a:solidFill>
-            </a:ln>
-          </p:spPr>
-          <p:style>
-            <a:lnRef idx="2">
-              <a:schemeClr val="accent1">
-                <a:shade val="50000"/>
-              </a:schemeClr>
-            </a:lnRef>
-            <a:fillRef idx="1">
-              <a:schemeClr val="accent1"/>
-            </a:fillRef>
-            <a:effectRef idx="0">
-              <a:schemeClr val="accent1"/>
-            </a:effectRef>
-            <a:fontRef idx="minor">
-              <a:schemeClr val="lt1"/>
-            </a:fontRef>
-          </p:style>
-          <p:txBody>
-            <a:bodyPr rtlCol="0" anchor="ctr"/>
-            <a:lstStyle/>
-            <a:p>
-              <a:pPr algn="ctr"/>
-              <a:endParaRPr lang="en-US"/>
-            </a:p>
-          </p:txBody>
-        </p:sp>
-        <p:sp>
-          <p:nvSpPr>
-            <p:cNvPr id="49" name="Rectangle 48"/>
-            <p:cNvSpPr/>
-            <p:nvPr/>
-          </p:nvSpPr>
-          <p:spPr>
-            <a:xfrm>
-              <a:off x="5443061" y="1349572"/>
-              <a:ext cx="460007" cy="414227"/>
-            </a:xfrm>
-            <a:prstGeom prst="rect">
-              <a:avLst/>
-            </a:prstGeom>
-            <a:solidFill>
-              <a:schemeClr val="tx1"/>
-            </a:solidFill>
-            <a:ln>
-              <a:noFill/>
-            </a:ln>
-          </p:spPr>
-          <p:style>
-            <a:lnRef idx="2">
-              <a:schemeClr val="accent1">
-                <a:shade val="50000"/>
-              </a:schemeClr>
-            </a:lnRef>
-            <a:fillRef idx="1">
-              <a:schemeClr val="accent1"/>
-            </a:fillRef>
-            <a:effectRef idx="0">
-              <a:schemeClr val="accent1"/>
-            </a:effectRef>
-            <a:fontRef idx="minor">
-              <a:schemeClr val="lt1"/>
-            </a:fontRef>
-          </p:style>
-          <p:txBody>
-            <a:bodyPr rtlCol="0" anchor="ctr"/>
-            <a:lstStyle/>
-            <a:p>
-              <a:pPr algn="ctr"/>
-              <a:endParaRPr lang="en-US" dirty="0"/>
-            </a:p>
-          </p:txBody>
-        </p:sp>
-        <p:sp>
-          <p:nvSpPr>
-            <p:cNvPr id="50" name="Rectangle 49"/>
-            <p:cNvSpPr/>
-            <p:nvPr/>
-          </p:nvSpPr>
-          <p:spPr>
-            <a:xfrm>
-              <a:off x="6038419" y="1349572"/>
-              <a:ext cx="460007" cy="414227"/>
-            </a:xfrm>
-            <a:prstGeom prst="rect">
-              <a:avLst/>
-            </a:prstGeom>
-            <a:solidFill>
-              <a:schemeClr val="tx1"/>
-            </a:solidFill>
-            <a:ln>
-              <a:noFill/>
-            </a:ln>
-          </p:spPr>
-          <p:style>
-            <a:lnRef idx="2">
-              <a:schemeClr val="accent1">
-                <a:shade val="50000"/>
-              </a:schemeClr>
-            </a:lnRef>
-            <a:fillRef idx="1">
-              <a:schemeClr val="accent1"/>
-            </a:fillRef>
-            <a:effectRef idx="0">
-              <a:schemeClr val="accent1"/>
-            </a:effectRef>
-            <a:fontRef idx="minor">
-              <a:schemeClr val="lt1"/>
-            </a:fontRef>
-          </p:style>
-          <p:txBody>
-            <a:bodyPr rtlCol="0" anchor="ctr"/>
-            <a:lstStyle/>
-            <a:p>
-              <a:pPr algn="ctr"/>
-              <a:endParaRPr lang="en-US" dirty="0"/>
-            </a:p>
-          </p:txBody>
-        </p:sp>
-        <p:sp>
-          <p:nvSpPr>
-            <p:cNvPr id="51" name="Rectangle 50"/>
-            <p:cNvSpPr/>
-            <p:nvPr/>
-          </p:nvSpPr>
-          <p:spPr>
-            <a:xfrm>
-              <a:off x="6623947" y="1349571"/>
-              <a:ext cx="460007" cy="414227"/>
-            </a:xfrm>
-            <a:prstGeom prst="rect">
-              <a:avLst/>
-            </a:prstGeom>
-            <a:solidFill>
-              <a:schemeClr val="tx1"/>
-            </a:solidFill>
-            <a:ln>
-              <a:noFill/>
-            </a:ln>
-          </p:spPr>
-          <p:style>
-            <a:lnRef idx="2">
-              <a:schemeClr val="accent1">
-                <a:shade val="50000"/>
-              </a:schemeClr>
-            </a:lnRef>
-            <a:fillRef idx="1">
-              <a:schemeClr val="accent1"/>
-            </a:fillRef>
-            <a:effectRef idx="0">
-              <a:schemeClr val="accent1"/>
-            </a:effectRef>
-            <a:fontRef idx="minor">
-              <a:schemeClr val="lt1"/>
-            </a:fontRef>
-          </p:style>
-          <p:txBody>
-            <a:bodyPr rtlCol="0" anchor="ctr"/>
-            <a:lstStyle/>
-            <a:p>
-              <a:pPr algn="ctr"/>
-              <a:endParaRPr lang="en-US" dirty="0"/>
-            </a:p>
-          </p:txBody>
-        </p:sp>
-        <p:sp>
-          <p:nvSpPr>
-            <p:cNvPr id="52" name="Rectangle 51"/>
-            <p:cNvSpPr/>
-            <p:nvPr/>
-          </p:nvSpPr>
-          <p:spPr>
-            <a:xfrm>
-              <a:off x="4834048" y="828212"/>
-              <a:ext cx="460007" cy="414227"/>
-            </a:xfrm>
-            <a:prstGeom prst="rect">
-              <a:avLst/>
-            </a:prstGeom>
-            <a:solidFill>
-              <a:schemeClr val="tx1"/>
-            </a:solidFill>
-            <a:ln>
-              <a:noFill/>
-            </a:ln>
-          </p:spPr>
-          <p:style>
-            <a:lnRef idx="2">
-              <a:schemeClr val="accent1">
-                <a:shade val="50000"/>
-              </a:schemeClr>
-            </a:lnRef>
-            <a:fillRef idx="1">
-              <a:schemeClr val="accent1"/>
-            </a:fillRef>
-            <a:effectRef idx="0">
-              <a:schemeClr val="accent1"/>
-            </a:effectRef>
-            <a:fontRef idx="minor">
-              <a:schemeClr val="lt1"/>
-            </a:fontRef>
-          </p:style>
-          <p:txBody>
-            <a:bodyPr rtlCol="0" anchor="ctr"/>
-            <a:lstStyle/>
-            <a:p>
-              <a:pPr algn="ctr"/>
-              <a:r>
-                <a:rPr lang="en-US" dirty="0" smtClean="0"/>
-                <a:t>x</a:t>
-              </a:r>
-              <a:endParaRPr lang="en-US" dirty="0"/>
-            </a:p>
-          </p:txBody>
-        </p:sp>
-        <p:sp>
-          <p:nvSpPr>
-            <p:cNvPr id="53" name="Rectangle 52"/>
-            <p:cNvSpPr/>
-            <p:nvPr/>
-          </p:nvSpPr>
-          <p:spPr>
-            <a:xfrm>
-              <a:off x="5443061" y="828211"/>
-              <a:ext cx="460007" cy="414227"/>
-            </a:xfrm>
-            <a:prstGeom prst="rect">
-              <a:avLst/>
-            </a:prstGeom>
-            <a:solidFill>
-              <a:schemeClr val="tx1"/>
-            </a:solidFill>
-            <a:ln>
-              <a:noFill/>
-            </a:ln>
-          </p:spPr>
-          <p:style>
-            <a:lnRef idx="2">
-              <a:schemeClr val="accent1">
-                <a:shade val="50000"/>
-              </a:schemeClr>
-            </a:lnRef>
-            <a:fillRef idx="1">
-              <a:schemeClr val="accent1"/>
-            </a:fillRef>
-            <a:effectRef idx="0">
-              <a:schemeClr val="accent1"/>
-            </a:effectRef>
-            <a:fontRef idx="minor">
-              <a:schemeClr val="lt1"/>
-            </a:fontRef>
-          </p:style>
-          <p:txBody>
-            <a:bodyPr rtlCol="0" anchor="ctr"/>
-            <a:lstStyle/>
-            <a:p>
-              <a:pPr algn="ctr"/>
-              <a:endParaRPr lang="en-US" dirty="0"/>
-            </a:p>
-          </p:txBody>
-        </p:sp>
-        <p:sp>
-          <p:nvSpPr>
-            <p:cNvPr id="54" name="Rectangle 53"/>
-            <p:cNvSpPr/>
-            <p:nvPr/>
-          </p:nvSpPr>
-          <p:spPr>
-            <a:xfrm>
-              <a:off x="6038419" y="828211"/>
-              <a:ext cx="460007" cy="414227"/>
-            </a:xfrm>
-            <a:prstGeom prst="rect">
-              <a:avLst/>
-            </a:prstGeom>
-            <a:solidFill>
-              <a:schemeClr val="tx1"/>
-            </a:solidFill>
-            <a:ln>
-              <a:noFill/>
-            </a:ln>
-          </p:spPr>
-          <p:style>
-            <a:lnRef idx="2">
-              <a:schemeClr val="accent1">
-                <a:shade val="50000"/>
-              </a:schemeClr>
-            </a:lnRef>
-            <a:fillRef idx="1">
-              <a:schemeClr val="accent1"/>
-            </a:fillRef>
-            <a:effectRef idx="0">
-              <a:schemeClr val="accent1"/>
-            </a:effectRef>
-            <a:fontRef idx="minor">
-              <a:schemeClr val="lt1"/>
-            </a:fontRef>
-          </p:style>
-          <p:txBody>
-            <a:bodyPr rtlCol="0" anchor="ctr"/>
-            <a:lstStyle/>
-            <a:p>
-              <a:pPr algn="ctr"/>
-              <a:endParaRPr lang="en-US" dirty="0"/>
-            </a:p>
-          </p:txBody>
-        </p:sp>
-        <p:sp>
-          <p:nvSpPr>
-            <p:cNvPr id="55" name="Rectangle 54"/>
-            <p:cNvSpPr/>
-            <p:nvPr/>
-          </p:nvSpPr>
-          <p:spPr>
-            <a:xfrm>
-              <a:off x="6623947" y="828210"/>
-              <a:ext cx="460007" cy="414227"/>
-            </a:xfrm>
-            <a:prstGeom prst="rect">
-              <a:avLst/>
-            </a:prstGeom>
-            <a:solidFill>
-              <a:schemeClr val="tx1"/>
-            </a:solidFill>
-            <a:ln>
-              <a:noFill/>
-            </a:ln>
-          </p:spPr>
-          <p:style>
-            <a:lnRef idx="2">
-              <a:schemeClr val="accent1">
-                <a:shade val="50000"/>
-              </a:schemeClr>
-            </a:lnRef>
-            <a:fillRef idx="1">
-              <a:schemeClr val="accent1"/>
-            </a:fillRef>
-            <a:effectRef idx="0">
-              <a:schemeClr val="accent1"/>
-            </a:effectRef>
-            <a:fontRef idx="minor">
-              <a:schemeClr val="lt1"/>
-            </a:fontRef>
-          </p:style>
-          <p:txBody>
-            <a:bodyPr rtlCol="0" anchor="ctr"/>
-            <a:lstStyle/>
-            <a:p>
-              <a:pPr algn="ctr"/>
-              <a:endParaRPr lang="en-US" dirty="0"/>
-            </a:p>
-          </p:txBody>
-        </p:sp>
-        <p:sp>
-          <p:nvSpPr>
-            <p:cNvPr id="56" name="Rectangle 55"/>
-            <p:cNvSpPr/>
-            <p:nvPr/>
-          </p:nvSpPr>
-          <p:spPr>
-            <a:xfrm>
-              <a:off x="4834048" y="1865120"/>
-              <a:ext cx="460007" cy="414227"/>
-            </a:xfrm>
-            <a:prstGeom prst="rect">
-              <a:avLst/>
-            </a:prstGeom>
-            <a:solidFill>
-              <a:schemeClr val="tx1"/>
-            </a:solidFill>
-            <a:ln>
-              <a:noFill/>
-            </a:ln>
-          </p:spPr>
-          <p:style>
-            <a:lnRef idx="2">
-              <a:schemeClr val="accent1">
-                <a:shade val="50000"/>
-              </a:schemeClr>
-            </a:lnRef>
-            <a:fillRef idx="1">
-              <a:schemeClr val="accent1"/>
-            </a:fillRef>
-            <a:effectRef idx="0">
-              <a:schemeClr val="accent1"/>
-            </a:effectRef>
-            <a:fontRef idx="minor">
-              <a:schemeClr val="lt1"/>
-            </a:fontRef>
-          </p:style>
-          <p:txBody>
-            <a:bodyPr rtlCol="0" anchor="ctr"/>
-            <a:lstStyle/>
-            <a:p>
-              <a:pPr algn="ctr"/>
-              <a:r>
-                <a:rPr lang="en-US" dirty="0" smtClean="0"/>
-                <a:t>x</a:t>
-              </a:r>
-              <a:endParaRPr lang="en-US" dirty="0"/>
-            </a:p>
-          </p:txBody>
-        </p:sp>
-        <p:sp>
-          <p:nvSpPr>
-            <p:cNvPr id="57" name="Rectangle 56"/>
-            <p:cNvSpPr/>
-            <p:nvPr/>
-          </p:nvSpPr>
-          <p:spPr>
-            <a:xfrm>
-              <a:off x="5443061" y="1865119"/>
-              <a:ext cx="460007" cy="414227"/>
-            </a:xfrm>
-            <a:prstGeom prst="rect">
-              <a:avLst/>
-            </a:prstGeom>
-            <a:solidFill>
-              <a:schemeClr val="tx1"/>
-            </a:solidFill>
-            <a:ln>
-              <a:noFill/>
-            </a:ln>
-          </p:spPr>
-          <p:style>
-            <a:lnRef idx="2">
-              <a:schemeClr val="accent1">
-                <a:shade val="50000"/>
-              </a:schemeClr>
-            </a:lnRef>
-            <a:fillRef idx="1">
-              <a:schemeClr val="accent1"/>
-            </a:fillRef>
-            <a:effectRef idx="0">
-              <a:schemeClr val="accent1"/>
-            </a:effectRef>
-            <a:fontRef idx="minor">
-              <a:schemeClr val="lt1"/>
-            </a:fontRef>
-          </p:style>
-          <p:txBody>
-            <a:bodyPr rtlCol="0" anchor="ctr"/>
-            <a:lstStyle/>
-            <a:p>
-              <a:pPr algn="ctr"/>
-              <a:endParaRPr lang="en-US" dirty="0"/>
-            </a:p>
-          </p:txBody>
-        </p:sp>
-        <p:sp>
-          <p:nvSpPr>
-            <p:cNvPr id="58" name="Rectangle 57"/>
-            <p:cNvSpPr/>
-            <p:nvPr/>
-          </p:nvSpPr>
-          <p:spPr>
-            <a:xfrm>
-              <a:off x="6038419" y="1865119"/>
-              <a:ext cx="460007" cy="414227"/>
-            </a:xfrm>
-            <a:prstGeom prst="rect">
-              <a:avLst/>
-            </a:prstGeom>
-            <a:solidFill>
-              <a:schemeClr val="tx1"/>
-            </a:solidFill>
-            <a:ln>
-              <a:noFill/>
-            </a:ln>
-          </p:spPr>
-          <p:style>
-            <a:lnRef idx="2">
-              <a:schemeClr val="accent1">
-                <a:shade val="50000"/>
-              </a:schemeClr>
-            </a:lnRef>
-            <a:fillRef idx="1">
-              <a:schemeClr val="accent1"/>
-            </a:fillRef>
-            <a:effectRef idx="0">
-              <a:schemeClr val="accent1"/>
-            </a:effectRef>
-            <a:fontRef idx="minor">
-              <a:schemeClr val="lt1"/>
-            </a:fontRef>
-          </p:style>
-          <p:txBody>
-            <a:bodyPr rtlCol="0" anchor="ctr"/>
-            <a:lstStyle/>
-            <a:p>
-              <a:pPr algn="ctr"/>
-              <a:endParaRPr lang="en-US" dirty="0"/>
-            </a:p>
-          </p:txBody>
-        </p:sp>
-        <p:sp>
-          <p:nvSpPr>
-            <p:cNvPr id="59" name="Rectangle 58"/>
-            <p:cNvSpPr/>
-            <p:nvPr/>
-          </p:nvSpPr>
-          <p:spPr>
-            <a:xfrm>
-              <a:off x="6623947" y="1865118"/>
-              <a:ext cx="460007" cy="414227"/>
-            </a:xfrm>
-            <a:prstGeom prst="rect">
-              <a:avLst/>
-            </a:prstGeom>
-            <a:solidFill>
-              <a:schemeClr val="tx1"/>
-            </a:solidFill>
-            <a:ln>
-              <a:noFill/>
-            </a:ln>
-          </p:spPr>
-          <p:style>
-            <a:lnRef idx="2">
-              <a:schemeClr val="accent1">
-                <a:shade val="50000"/>
-              </a:schemeClr>
-            </a:lnRef>
-            <a:fillRef idx="1">
-              <a:schemeClr val="accent1"/>
-            </a:fillRef>
-            <a:effectRef idx="0">
-              <a:schemeClr val="accent1"/>
-            </a:effectRef>
-            <a:fontRef idx="minor">
-              <a:schemeClr val="lt1"/>
-            </a:fontRef>
-          </p:style>
-          <p:txBody>
-            <a:bodyPr rtlCol="0" anchor="ctr"/>
-            <a:lstStyle/>
-            <a:p>
-              <a:pPr algn="ctr"/>
-              <a:endParaRPr lang="en-US" dirty="0"/>
-            </a:p>
-          </p:txBody>
-        </p:sp>
-        <p:sp>
-          <p:nvSpPr>
-            <p:cNvPr id="60" name="Rectangle 59"/>
-            <p:cNvSpPr/>
-            <p:nvPr/>
-          </p:nvSpPr>
-          <p:spPr>
-            <a:xfrm>
-              <a:off x="4834048" y="2380667"/>
-              <a:ext cx="460007" cy="414227"/>
-            </a:xfrm>
-            <a:prstGeom prst="rect">
-              <a:avLst/>
-            </a:prstGeom>
-            <a:solidFill>
-              <a:schemeClr val="tx1"/>
-            </a:solidFill>
-            <a:ln>
-              <a:noFill/>
-            </a:ln>
-          </p:spPr>
-          <p:style>
-            <a:lnRef idx="2">
-              <a:schemeClr val="accent1">
-                <a:shade val="50000"/>
-              </a:schemeClr>
-            </a:lnRef>
-            <a:fillRef idx="1">
-              <a:schemeClr val="accent1"/>
-            </a:fillRef>
-            <a:effectRef idx="0">
-              <a:schemeClr val="accent1"/>
-            </a:effectRef>
-            <a:fontRef idx="minor">
-              <a:schemeClr val="lt1"/>
-            </a:fontRef>
-          </p:style>
-          <p:txBody>
-            <a:bodyPr rtlCol="0" anchor="ctr"/>
-            <a:lstStyle/>
-            <a:p>
-              <a:pPr algn="ctr"/>
-              <a:r>
-                <a:rPr lang="en-US" dirty="0" smtClean="0"/>
-                <a:t>x</a:t>
-              </a:r>
-              <a:endParaRPr lang="en-US" dirty="0"/>
-            </a:p>
-          </p:txBody>
-        </p:sp>
-        <p:sp>
-          <p:nvSpPr>
-            <p:cNvPr id="61" name="Rectangle 60"/>
-            <p:cNvSpPr/>
-            <p:nvPr/>
-          </p:nvSpPr>
-          <p:spPr>
-            <a:xfrm>
-              <a:off x="5443061" y="2380666"/>
-              <a:ext cx="460007" cy="414227"/>
-            </a:xfrm>
-            <a:prstGeom prst="rect">
-              <a:avLst/>
-            </a:prstGeom>
-            <a:solidFill>
-              <a:schemeClr val="tx1"/>
-            </a:solidFill>
-            <a:ln>
-              <a:noFill/>
-            </a:ln>
-          </p:spPr>
-          <p:style>
-            <a:lnRef idx="2">
-              <a:schemeClr val="accent1">
-                <a:shade val="50000"/>
-              </a:schemeClr>
-            </a:lnRef>
-            <a:fillRef idx="1">
-              <a:schemeClr val="accent1"/>
-            </a:fillRef>
-            <a:effectRef idx="0">
-              <a:schemeClr val="accent1"/>
-            </a:effectRef>
-            <a:fontRef idx="minor">
-              <a:schemeClr val="lt1"/>
-            </a:fontRef>
-          </p:style>
-          <p:txBody>
-            <a:bodyPr rtlCol="0" anchor="ctr"/>
-            <a:lstStyle/>
-            <a:p>
-              <a:pPr algn="ctr"/>
-              <a:endParaRPr lang="en-US" dirty="0"/>
-            </a:p>
-          </p:txBody>
-        </p:sp>
-        <p:sp>
-          <p:nvSpPr>
-            <p:cNvPr id="62" name="Rectangle 61"/>
-            <p:cNvSpPr/>
-            <p:nvPr/>
-          </p:nvSpPr>
-          <p:spPr>
-            <a:xfrm>
-              <a:off x="6038419" y="2380666"/>
-              <a:ext cx="460007" cy="414227"/>
-            </a:xfrm>
-            <a:prstGeom prst="rect">
-              <a:avLst/>
-            </a:prstGeom>
-            <a:solidFill>
-              <a:schemeClr val="tx1"/>
-            </a:solidFill>
-            <a:ln>
-              <a:noFill/>
-            </a:ln>
-          </p:spPr>
-          <p:style>
-            <a:lnRef idx="2">
-              <a:schemeClr val="accent1">
-                <a:shade val="50000"/>
-              </a:schemeClr>
-            </a:lnRef>
-            <a:fillRef idx="1">
-              <a:schemeClr val="accent1"/>
-            </a:fillRef>
-            <a:effectRef idx="0">
-              <a:schemeClr val="accent1"/>
-            </a:effectRef>
-            <a:fontRef idx="minor">
-              <a:schemeClr val="lt1"/>
-            </a:fontRef>
-          </p:style>
-          <p:txBody>
-            <a:bodyPr rtlCol="0" anchor="ctr"/>
-            <a:lstStyle/>
-            <a:p>
-              <a:pPr algn="ctr"/>
-              <a:endParaRPr lang="en-US" dirty="0"/>
-            </a:p>
-          </p:txBody>
-        </p:sp>
-      </p:grpSp>
-      <p:grpSp>
-        <p:nvGrpSpPr>
-          <p:cNvPr id="66" name="Group 65"/>
-          <p:cNvGrpSpPr/>
-          <p:nvPr/>
-        </p:nvGrpSpPr>
-        <p:grpSpPr>
-          <a:xfrm>
-            <a:off x="-1273428" y="628549"/>
-            <a:ext cx="3120601" cy="2839189"/>
-            <a:chOff x="-603031" y="-150864"/>
-            <a:chExt cx="3373394" cy="3323967"/>
-          </a:xfrm>
-        </p:grpSpPr>
-        <p:sp>
-          <p:nvSpPr>
-            <p:cNvPr id="63" name="Oval 62"/>
-            <p:cNvSpPr/>
-            <p:nvPr/>
-          </p:nvSpPr>
-          <p:spPr>
-            <a:xfrm>
-              <a:off x="-603031" y="-150864"/>
-              <a:ext cx="3373394" cy="3323967"/>
-            </a:xfrm>
-            <a:prstGeom prst="ellipse">
-              <a:avLst/>
-            </a:prstGeom>
-            <a:noFill/>
-            <a:ln w="76200">
-              <a:solidFill>
-                <a:schemeClr val="tx1">
-                  <a:lumMod val="95000"/>
-                </a:schemeClr>
-              </a:solidFill>
-            </a:ln>
-          </p:spPr>
-          <p:style>
-            <a:lnRef idx="2">
-              <a:schemeClr val="accent1">
-                <a:shade val="50000"/>
-              </a:schemeClr>
-            </a:lnRef>
-            <a:fillRef idx="1">
-              <a:schemeClr val="accent1"/>
-            </a:fillRef>
-            <a:effectRef idx="0">
-              <a:schemeClr val="accent1"/>
-            </a:effectRef>
-            <a:fontRef idx="minor">
-              <a:schemeClr val="lt1"/>
-            </a:fontRef>
-          </p:style>
-          <p:txBody>
-            <a:bodyPr rtlCol="0" anchor="ctr"/>
-            <a:lstStyle/>
-            <a:p>
-              <a:pPr algn="ctr"/>
-              <a:endParaRPr lang="en-US"/>
-            </a:p>
-          </p:txBody>
-        </p:sp>
-        <p:sp>
-          <p:nvSpPr>
-            <p:cNvPr id="64" name="Isosceles Triangle 63"/>
-            <p:cNvSpPr/>
-            <p:nvPr/>
-          </p:nvSpPr>
-          <p:spPr>
-            <a:xfrm>
-              <a:off x="-190640" y="318570"/>
-              <a:ext cx="2548611" cy="947637"/>
-            </a:xfrm>
-            <a:prstGeom prst="triangle">
-              <a:avLst>
-                <a:gd name="adj" fmla="val 52147"/>
-              </a:avLst>
-            </a:prstGeom>
-            <a:solidFill>
-              <a:schemeClr val="tx1"/>
-            </a:solidFill>
-            <a:ln>
-              <a:noFill/>
-            </a:ln>
-          </p:spPr>
-          <p:style>
-            <a:lnRef idx="2">
-              <a:schemeClr val="accent1">
-                <a:shade val="50000"/>
-              </a:schemeClr>
-            </a:lnRef>
-            <a:fillRef idx="1">
-              <a:schemeClr val="accent1"/>
-            </a:fillRef>
-            <a:effectRef idx="0">
-              <a:schemeClr val="accent1"/>
-            </a:effectRef>
-            <a:fontRef idx="minor">
-              <a:schemeClr val="lt1"/>
-            </a:fontRef>
-          </p:style>
-          <p:txBody>
-            <a:bodyPr rtlCol="0" anchor="ctr"/>
-            <a:lstStyle/>
-            <a:p>
-              <a:pPr algn="ctr"/>
-              <a:endParaRPr lang="en-US"/>
-            </a:p>
-          </p:txBody>
-        </p:sp>
-        <p:sp>
-          <p:nvSpPr>
-            <p:cNvPr id="65" name="Rectangle 64"/>
-            <p:cNvSpPr/>
-            <p:nvPr/>
-          </p:nvSpPr>
-          <p:spPr>
-            <a:xfrm>
-              <a:off x="200754" y="1389957"/>
-              <a:ext cx="1715575" cy="1197822"/>
-            </a:xfrm>
-            <a:prstGeom prst="rect">
-              <a:avLst/>
-            </a:prstGeom>
-            <a:solidFill>
-              <a:schemeClr val="tx1"/>
-            </a:solidFill>
-            <a:ln>
-              <a:noFill/>
-            </a:ln>
-          </p:spPr>
-          <p:style>
-            <a:lnRef idx="2">
-              <a:schemeClr val="accent1">
-                <a:shade val="50000"/>
-              </a:schemeClr>
-            </a:lnRef>
-            <a:fillRef idx="1">
-              <a:schemeClr val="accent1"/>
-            </a:fillRef>
-            <a:effectRef idx="0">
-              <a:schemeClr val="accent1"/>
-            </a:effectRef>
-            <a:fontRef idx="minor">
-              <a:schemeClr val="lt1"/>
-            </a:fontRef>
-          </p:style>
-          <p:txBody>
-            <a:bodyPr rtlCol="0" anchor="ctr"/>
-            <a:lstStyle/>
-            <a:p>
-              <a:pPr algn="ctr"/>
-              <a:r>
-                <a:rPr lang="en-US" dirty="0" smtClean="0"/>
-                <a:t>x</a:t>
-              </a:r>
-              <a:endParaRPr lang="en-US" dirty="0"/>
-            </a:p>
-          </p:txBody>
-        </p:sp>
-      </p:grpSp>
       <p:grpSp>
         <p:nvGrpSpPr>
           <p:cNvPr id="68" name="Group 67"/>
@@ -6984,11 +6954,19 @@
         </p:nvGrpSpPr>
         <p:grpSpPr>
           <a:xfrm>
-            <a:off x="11606902" y="897723"/>
-            <a:ext cx="2537946" cy="2384139"/>
+            <a:off x="9191374" y="975851"/>
+            <a:ext cx="2532958" cy="2295958"/>
             <a:chOff x="5989247" y="1845961"/>
             <a:chExt cx="4061994" cy="3940776"/>
           </a:xfrm>
+          <a:blipFill>
+            <a:blip r:embed="rId2"/>
+            <a:tile tx="0" ty="0" sx="100000" sy="100000" flip="none" algn="tl"/>
+          </a:blipFill>
+          <a:scene3d>
+            <a:camera prst="orthographicFront"/>
+            <a:lightRig rig="chilly" dir="t"/>
+          </a:scene3d>
         </p:grpSpPr>
         <p:sp>
           <p:nvSpPr>
@@ -7007,11 +6985,12 @@
             <a:noFill/>
             <a:ln w="76200">
               <a:solidFill>
-                <a:schemeClr val="tx1">
-                  <a:lumMod val="95000"/>
-                </a:schemeClr>
+                <a:schemeClr val="tx1"/>
               </a:solidFill>
             </a:ln>
+            <a:sp3d>
+              <a:bevelT w="152400" h="50800" prst="softRound"/>
+            </a:sp3d>
           </p:spPr>
           <p:style>
             <a:lnRef idx="2">
@@ -7056,8 +7035,1227 @@
               <a:schemeClr val="tx1"/>
             </a:solidFill>
             <a:ln>
+              <a:solidFill>
+                <a:schemeClr val="tx1">
+                  <a:lumMod val="50000"/>
+                </a:schemeClr>
+              </a:solidFill>
+            </a:ln>
+            <a:sp3d>
+              <a:bevelT w="152400" h="50800" prst="softRound"/>
+            </a:sp3d>
+          </p:spPr>
+          <p:style>
+            <a:lnRef idx="2">
+              <a:schemeClr val="accent1">
+                <a:shade val="50000"/>
+              </a:schemeClr>
+            </a:lnRef>
+            <a:fillRef idx="1">
+              <a:schemeClr val="accent1"/>
+            </a:fillRef>
+            <a:effectRef idx="0">
+              <a:schemeClr val="accent1"/>
+            </a:effectRef>
+            <a:fontRef idx="minor">
+              <a:schemeClr val="lt1"/>
+            </a:fontRef>
+          </p:style>
+          <p:txBody>
+            <a:bodyPr rtlCol="0" anchor="ctr"/>
+            <a:lstStyle/>
+            <a:p>
+              <a:pPr algn="ctr"/>
+              <a:endParaRPr lang="en-US"/>
+            </a:p>
+          </p:txBody>
+        </p:sp>
+      </p:grpSp>
+      <p:grpSp>
+        <p:nvGrpSpPr>
+          <p:cNvPr id="4" name="Group 3"/>
+          <p:cNvGrpSpPr/>
+          <p:nvPr/>
+        </p:nvGrpSpPr>
+        <p:grpSpPr>
+          <a:xfrm>
+            <a:off x="6217322" y="949971"/>
+            <a:ext cx="2572591" cy="2321838"/>
+            <a:chOff x="6553517" y="411355"/>
+            <a:chExt cx="3243889" cy="3140877"/>
+          </a:xfrm>
+          <a:blipFill>
+            <a:blip r:embed="rId2"/>
+            <a:tile tx="0" ty="0" sx="100000" sy="100000" flip="none" algn="tl"/>
+          </a:blipFill>
+        </p:grpSpPr>
+        <p:sp>
+          <p:nvSpPr>
+            <p:cNvPr id="39" name="Oval 38"/>
+            <p:cNvSpPr/>
+            <p:nvPr/>
+          </p:nvSpPr>
+          <p:spPr>
+            <a:xfrm>
+              <a:off x="6553517" y="411355"/>
+              <a:ext cx="3243889" cy="3140877"/>
+            </a:xfrm>
+            <a:prstGeom prst="ellipse">
+              <a:avLst/>
+            </a:prstGeom>
+            <a:noFill/>
+            <a:ln w="76200">
+              <a:solidFill>
+                <a:schemeClr val="tx1"/>
+              </a:solidFill>
+            </a:ln>
+            <a:scene3d>
+              <a:camera prst="orthographicFront"/>
+              <a:lightRig rig="chilly" dir="t"/>
+            </a:scene3d>
+            <a:sp3d>
+              <a:bevelT w="152400" h="50800" prst="softRound"/>
+            </a:sp3d>
+          </p:spPr>
+          <p:style>
+            <a:lnRef idx="2">
+              <a:schemeClr val="accent1">
+                <a:shade val="50000"/>
+              </a:schemeClr>
+            </a:lnRef>
+            <a:fillRef idx="1">
+              <a:schemeClr val="accent1"/>
+            </a:fillRef>
+            <a:effectRef idx="0">
+              <a:schemeClr val="accent1"/>
+            </a:effectRef>
+            <a:fontRef idx="minor">
+              <a:schemeClr val="lt1"/>
+            </a:fontRef>
+          </p:style>
+          <p:txBody>
+            <a:bodyPr rtlCol="0" anchor="ctr"/>
+            <a:lstStyle/>
+            <a:p>
+              <a:pPr algn="ctr"/>
+              <a:endParaRPr lang="en-US"/>
+            </a:p>
+          </p:txBody>
+        </p:sp>
+        <p:sp>
+          <p:nvSpPr>
+            <p:cNvPr id="3" name="Rectangle 2"/>
+            <p:cNvSpPr/>
+            <p:nvPr/>
+          </p:nvSpPr>
+          <p:spPr>
+            <a:xfrm>
+              <a:off x="7366000" y="1174444"/>
+              <a:ext cx="368300" cy="342900"/>
+            </a:xfrm>
+            <a:prstGeom prst="rect">
+              <a:avLst/>
+            </a:prstGeom>
+            <a:solidFill>
+              <a:schemeClr val="tx1">
+                <a:lumMod val="95000"/>
+              </a:schemeClr>
+            </a:solidFill>
+            <a:ln>
               <a:noFill/>
             </a:ln>
+            <a:scene3d>
+              <a:camera prst="orthographicFront"/>
+              <a:lightRig rig="threePt" dir="t"/>
+            </a:scene3d>
+            <a:sp3d>
+              <a:bevelT/>
+            </a:sp3d>
+          </p:spPr>
+          <p:style>
+            <a:lnRef idx="2">
+              <a:schemeClr val="accent1">
+                <a:shade val="50000"/>
+              </a:schemeClr>
+            </a:lnRef>
+            <a:fillRef idx="1">
+              <a:schemeClr val="accent1"/>
+            </a:fillRef>
+            <a:effectRef idx="0">
+              <a:schemeClr val="accent1"/>
+            </a:effectRef>
+            <a:fontRef idx="minor">
+              <a:schemeClr val="lt1"/>
+            </a:fontRef>
+          </p:style>
+          <p:txBody>
+            <a:bodyPr rtlCol="0" anchor="ctr"/>
+            <a:lstStyle/>
+            <a:p>
+              <a:pPr algn="ctr"/>
+              <a:endParaRPr lang="en-US" sz="1400" dirty="0"/>
+            </a:p>
+          </p:txBody>
+        </p:sp>
+        <p:sp>
+          <p:nvSpPr>
+            <p:cNvPr id="41" name="Rectangle 40"/>
+            <p:cNvSpPr/>
+            <p:nvPr/>
+          </p:nvSpPr>
+          <p:spPr>
+            <a:xfrm>
+              <a:off x="7807085" y="1174444"/>
+              <a:ext cx="368300" cy="342900"/>
+            </a:xfrm>
+            <a:prstGeom prst="rect">
+              <a:avLst/>
+            </a:prstGeom>
+            <a:solidFill>
+              <a:schemeClr val="tx1">
+                <a:lumMod val="95000"/>
+              </a:schemeClr>
+            </a:solidFill>
+            <a:ln>
+              <a:noFill/>
+            </a:ln>
+            <a:scene3d>
+              <a:camera prst="orthographicFront"/>
+              <a:lightRig rig="threePt" dir="t"/>
+            </a:scene3d>
+            <a:sp3d>
+              <a:bevelT/>
+            </a:sp3d>
+          </p:spPr>
+          <p:style>
+            <a:lnRef idx="2">
+              <a:schemeClr val="accent1">
+                <a:shade val="50000"/>
+              </a:schemeClr>
+            </a:lnRef>
+            <a:fillRef idx="1">
+              <a:schemeClr val="accent1"/>
+            </a:fillRef>
+            <a:effectRef idx="0">
+              <a:schemeClr val="accent1"/>
+            </a:effectRef>
+            <a:fontRef idx="minor">
+              <a:schemeClr val="lt1"/>
+            </a:fontRef>
+          </p:style>
+          <p:txBody>
+            <a:bodyPr rtlCol="0" anchor="ctr"/>
+            <a:lstStyle/>
+            <a:p>
+              <a:pPr algn="ctr"/>
+              <a:endParaRPr lang="en-US" sz="1400" dirty="0"/>
+            </a:p>
+          </p:txBody>
+        </p:sp>
+        <p:sp>
+          <p:nvSpPr>
+            <p:cNvPr id="43" name="Rectangle 42"/>
+            <p:cNvSpPr/>
+            <p:nvPr/>
+          </p:nvSpPr>
+          <p:spPr>
+            <a:xfrm>
+              <a:off x="8228051" y="1174444"/>
+              <a:ext cx="368300" cy="342900"/>
+            </a:xfrm>
+            <a:prstGeom prst="rect">
+              <a:avLst/>
+            </a:prstGeom>
+            <a:solidFill>
+              <a:schemeClr val="tx1">
+                <a:lumMod val="95000"/>
+              </a:schemeClr>
+            </a:solidFill>
+            <a:ln>
+              <a:noFill/>
+            </a:ln>
+            <a:scene3d>
+              <a:camera prst="orthographicFront"/>
+              <a:lightRig rig="threePt" dir="t"/>
+            </a:scene3d>
+            <a:sp3d>
+              <a:bevelT/>
+            </a:sp3d>
+          </p:spPr>
+          <p:style>
+            <a:lnRef idx="2">
+              <a:schemeClr val="accent1">
+                <a:shade val="50000"/>
+              </a:schemeClr>
+            </a:lnRef>
+            <a:fillRef idx="1">
+              <a:schemeClr val="accent1"/>
+            </a:fillRef>
+            <a:effectRef idx="0">
+              <a:schemeClr val="accent1"/>
+            </a:effectRef>
+            <a:fontRef idx="minor">
+              <a:schemeClr val="lt1"/>
+            </a:fontRef>
+          </p:style>
+          <p:txBody>
+            <a:bodyPr rtlCol="0" anchor="ctr"/>
+            <a:lstStyle/>
+            <a:p>
+              <a:pPr algn="ctr"/>
+              <a:endParaRPr lang="en-US" sz="1400" dirty="0"/>
+            </a:p>
+          </p:txBody>
+        </p:sp>
+        <p:sp>
+          <p:nvSpPr>
+            <p:cNvPr id="44" name="Rectangle 43"/>
+            <p:cNvSpPr/>
+            <p:nvPr/>
+          </p:nvSpPr>
+          <p:spPr>
+            <a:xfrm>
+              <a:off x="8649017" y="1174444"/>
+              <a:ext cx="368300" cy="342900"/>
+            </a:xfrm>
+            <a:prstGeom prst="rect">
+              <a:avLst/>
+            </a:prstGeom>
+            <a:solidFill>
+              <a:schemeClr val="tx1">
+                <a:lumMod val="95000"/>
+              </a:schemeClr>
+            </a:solidFill>
+            <a:ln>
+              <a:noFill/>
+            </a:ln>
+            <a:scene3d>
+              <a:camera prst="orthographicFront"/>
+              <a:lightRig rig="threePt" dir="t"/>
+            </a:scene3d>
+            <a:sp3d>
+              <a:bevelT/>
+            </a:sp3d>
+          </p:spPr>
+          <p:style>
+            <a:lnRef idx="2">
+              <a:schemeClr val="accent1">
+                <a:shade val="50000"/>
+              </a:schemeClr>
+            </a:lnRef>
+            <a:fillRef idx="1">
+              <a:schemeClr val="accent1"/>
+            </a:fillRef>
+            <a:effectRef idx="0">
+              <a:schemeClr val="accent1"/>
+            </a:effectRef>
+            <a:fontRef idx="minor">
+              <a:schemeClr val="lt1"/>
+            </a:fontRef>
+          </p:style>
+          <p:txBody>
+            <a:bodyPr rtlCol="0" anchor="ctr"/>
+            <a:lstStyle/>
+            <a:p>
+              <a:pPr algn="ctr"/>
+              <a:endParaRPr lang="en-US" sz="1400" dirty="0"/>
+            </a:p>
+          </p:txBody>
+        </p:sp>
+        <p:sp>
+          <p:nvSpPr>
+            <p:cNvPr id="45" name="Rectangle 44"/>
+            <p:cNvSpPr/>
+            <p:nvPr/>
+          </p:nvSpPr>
+          <p:spPr>
+            <a:xfrm>
+              <a:off x="7366000" y="1620173"/>
+              <a:ext cx="368300" cy="342900"/>
+            </a:xfrm>
+            <a:prstGeom prst="rect">
+              <a:avLst/>
+            </a:prstGeom>
+            <a:solidFill>
+              <a:schemeClr val="tx1">
+                <a:lumMod val="95000"/>
+              </a:schemeClr>
+            </a:solidFill>
+            <a:ln>
+              <a:noFill/>
+            </a:ln>
+            <a:scene3d>
+              <a:camera prst="orthographicFront"/>
+              <a:lightRig rig="threePt" dir="t"/>
+            </a:scene3d>
+            <a:sp3d>
+              <a:bevelT/>
+            </a:sp3d>
+          </p:spPr>
+          <p:style>
+            <a:lnRef idx="2">
+              <a:schemeClr val="accent1">
+                <a:shade val="50000"/>
+              </a:schemeClr>
+            </a:lnRef>
+            <a:fillRef idx="1">
+              <a:schemeClr val="accent1"/>
+            </a:fillRef>
+            <a:effectRef idx="0">
+              <a:schemeClr val="accent1"/>
+            </a:effectRef>
+            <a:fontRef idx="minor">
+              <a:schemeClr val="lt1"/>
+            </a:fontRef>
+          </p:style>
+          <p:txBody>
+            <a:bodyPr rtlCol="0" anchor="ctr"/>
+            <a:lstStyle/>
+            <a:p>
+              <a:pPr algn="ctr"/>
+              <a:endParaRPr lang="en-US" sz="1400" dirty="0"/>
+            </a:p>
+          </p:txBody>
+        </p:sp>
+        <p:sp>
+          <p:nvSpPr>
+            <p:cNvPr id="46" name="Rectangle 45"/>
+            <p:cNvSpPr/>
+            <p:nvPr/>
+          </p:nvSpPr>
+          <p:spPr>
+            <a:xfrm>
+              <a:off x="7791410" y="1620173"/>
+              <a:ext cx="368300" cy="342900"/>
+            </a:xfrm>
+            <a:prstGeom prst="rect">
+              <a:avLst/>
+            </a:prstGeom>
+            <a:solidFill>
+              <a:schemeClr val="tx1">
+                <a:lumMod val="95000"/>
+              </a:schemeClr>
+            </a:solidFill>
+            <a:ln>
+              <a:noFill/>
+            </a:ln>
+            <a:scene3d>
+              <a:camera prst="orthographicFront"/>
+              <a:lightRig rig="threePt" dir="t"/>
+            </a:scene3d>
+            <a:sp3d>
+              <a:bevelT/>
+            </a:sp3d>
+          </p:spPr>
+          <p:style>
+            <a:lnRef idx="2">
+              <a:schemeClr val="accent1">
+                <a:shade val="50000"/>
+              </a:schemeClr>
+            </a:lnRef>
+            <a:fillRef idx="1">
+              <a:schemeClr val="accent1"/>
+            </a:fillRef>
+            <a:effectRef idx="0">
+              <a:schemeClr val="accent1"/>
+            </a:effectRef>
+            <a:fontRef idx="minor">
+              <a:schemeClr val="lt1"/>
+            </a:fontRef>
+          </p:style>
+          <p:txBody>
+            <a:bodyPr rtlCol="0" anchor="ctr"/>
+            <a:lstStyle/>
+            <a:p>
+              <a:pPr algn="ctr"/>
+              <a:endParaRPr lang="en-US" sz="1400" dirty="0"/>
+            </a:p>
+          </p:txBody>
+        </p:sp>
+        <p:sp>
+          <p:nvSpPr>
+            <p:cNvPr id="47" name="Rectangle 46"/>
+            <p:cNvSpPr/>
+            <p:nvPr/>
+          </p:nvSpPr>
+          <p:spPr>
+            <a:xfrm>
+              <a:off x="8229243" y="1623942"/>
+              <a:ext cx="368300" cy="342900"/>
+            </a:xfrm>
+            <a:prstGeom prst="rect">
+              <a:avLst/>
+            </a:prstGeom>
+            <a:solidFill>
+              <a:schemeClr val="tx1">
+                <a:lumMod val="95000"/>
+              </a:schemeClr>
+            </a:solidFill>
+            <a:ln>
+              <a:noFill/>
+            </a:ln>
+            <a:scene3d>
+              <a:camera prst="orthographicFront"/>
+              <a:lightRig rig="threePt" dir="t"/>
+            </a:scene3d>
+            <a:sp3d>
+              <a:bevelT/>
+            </a:sp3d>
+          </p:spPr>
+          <p:style>
+            <a:lnRef idx="2">
+              <a:schemeClr val="accent1">
+                <a:shade val="50000"/>
+              </a:schemeClr>
+            </a:lnRef>
+            <a:fillRef idx="1">
+              <a:schemeClr val="accent1"/>
+            </a:fillRef>
+            <a:effectRef idx="0">
+              <a:schemeClr val="accent1"/>
+            </a:effectRef>
+            <a:fontRef idx="minor">
+              <a:schemeClr val="lt1"/>
+            </a:fontRef>
+          </p:style>
+          <p:txBody>
+            <a:bodyPr rtlCol="0" anchor="ctr"/>
+            <a:lstStyle/>
+            <a:p>
+              <a:pPr algn="ctr"/>
+              <a:endParaRPr lang="en-US" sz="1400" dirty="0"/>
+            </a:p>
+          </p:txBody>
+        </p:sp>
+        <p:sp>
+          <p:nvSpPr>
+            <p:cNvPr id="71" name="Rectangle 70"/>
+            <p:cNvSpPr/>
+            <p:nvPr/>
+          </p:nvSpPr>
+          <p:spPr>
+            <a:xfrm>
+              <a:off x="8656693" y="1618551"/>
+              <a:ext cx="368300" cy="342900"/>
+            </a:xfrm>
+            <a:prstGeom prst="rect">
+              <a:avLst/>
+            </a:prstGeom>
+            <a:solidFill>
+              <a:schemeClr val="tx1">
+                <a:lumMod val="95000"/>
+              </a:schemeClr>
+            </a:solidFill>
+            <a:ln>
+              <a:noFill/>
+            </a:ln>
+            <a:scene3d>
+              <a:camera prst="orthographicFront"/>
+              <a:lightRig rig="threePt" dir="t"/>
+            </a:scene3d>
+            <a:sp3d>
+              <a:bevelT/>
+            </a:sp3d>
+          </p:spPr>
+          <p:style>
+            <a:lnRef idx="2">
+              <a:schemeClr val="accent1">
+                <a:shade val="50000"/>
+              </a:schemeClr>
+            </a:lnRef>
+            <a:fillRef idx="1">
+              <a:schemeClr val="accent1"/>
+            </a:fillRef>
+            <a:effectRef idx="0">
+              <a:schemeClr val="accent1"/>
+            </a:effectRef>
+            <a:fontRef idx="minor">
+              <a:schemeClr val="lt1"/>
+            </a:fontRef>
+          </p:style>
+          <p:txBody>
+            <a:bodyPr rtlCol="0" anchor="ctr"/>
+            <a:lstStyle/>
+            <a:p>
+              <a:pPr algn="ctr"/>
+              <a:endParaRPr lang="en-US" sz="1400" dirty="0"/>
+            </a:p>
+          </p:txBody>
+        </p:sp>
+        <p:sp>
+          <p:nvSpPr>
+            <p:cNvPr id="72" name="Rectangle 71"/>
+            <p:cNvSpPr/>
+            <p:nvPr/>
+          </p:nvSpPr>
+          <p:spPr>
+            <a:xfrm>
+              <a:off x="7366000" y="2065678"/>
+              <a:ext cx="368300" cy="342900"/>
+            </a:xfrm>
+            <a:prstGeom prst="rect">
+              <a:avLst/>
+            </a:prstGeom>
+            <a:solidFill>
+              <a:schemeClr val="tx1">
+                <a:lumMod val="95000"/>
+              </a:schemeClr>
+            </a:solidFill>
+            <a:ln>
+              <a:noFill/>
+            </a:ln>
+            <a:scene3d>
+              <a:camera prst="orthographicFront"/>
+              <a:lightRig rig="threePt" dir="t"/>
+            </a:scene3d>
+            <a:sp3d>
+              <a:bevelT/>
+            </a:sp3d>
+          </p:spPr>
+          <p:style>
+            <a:lnRef idx="2">
+              <a:schemeClr val="accent1">
+                <a:shade val="50000"/>
+              </a:schemeClr>
+            </a:lnRef>
+            <a:fillRef idx="1">
+              <a:schemeClr val="accent1"/>
+            </a:fillRef>
+            <a:effectRef idx="0">
+              <a:schemeClr val="accent1"/>
+            </a:effectRef>
+            <a:fontRef idx="minor">
+              <a:schemeClr val="lt1"/>
+            </a:fontRef>
+          </p:style>
+          <p:txBody>
+            <a:bodyPr rtlCol="0" anchor="ctr"/>
+            <a:lstStyle/>
+            <a:p>
+              <a:pPr algn="ctr"/>
+              <a:endParaRPr lang="en-US" sz="1400" dirty="0"/>
+            </a:p>
+          </p:txBody>
+        </p:sp>
+        <p:sp>
+          <p:nvSpPr>
+            <p:cNvPr id="73" name="Rectangle 72"/>
+            <p:cNvSpPr/>
+            <p:nvPr/>
+          </p:nvSpPr>
+          <p:spPr>
+            <a:xfrm>
+              <a:off x="7799285" y="2062658"/>
+              <a:ext cx="368300" cy="342900"/>
+            </a:xfrm>
+            <a:prstGeom prst="rect">
+              <a:avLst/>
+            </a:prstGeom>
+            <a:solidFill>
+              <a:schemeClr val="tx1">
+                <a:lumMod val="95000"/>
+              </a:schemeClr>
+            </a:solidFill>
+            <a:ln>
+              <a:noFill/>
+            </a:ln>
+            <a:scene3d>
+              <a:camera prst="orthographicFront"/>
+              <a:lightRig rig="threePt" dir="t"/>
+            </a:scene3d>
+            <a:sp3d>
+              <a:bevelT/>
+            </a:sp3d>
+          </p:spPr>
+          <p:style>
+            <a:lnRef idx="2">
+              <a:schemeClr val="accent1">
+                <a:shade val="50000"/>
+              </a:schemeClr>
+            </a:lnRef>
+            <a:fillRef idx="1">
+              <a:schemeClr val="accent1"/>
+            </a:fillRef>
+            <a:effectRef idx="0">
+              <a:schemeClr val="accent1"/>
+            </a:effectRef>
+            <a:fontRef idx="minor">
+              <a:schemeClr val="lt1"/>
+            </a:fontRef>
+          </p:style>
+          <p:txBody>
+            <a:bodyPr rtlCol="0" anchor="ctr"/>
+            <a:lstStyle/>
+            <a:p>
+              <a:pPr algn="ctr"/>
+              <a:endParaRPr lang="en-US" sz="1400" dirty="0"/>
+            </a:p>
+          </p:txBody>
+        </p:sp>
+        <p:sp>
+          <p:nvSpPr>
+            <p:cNvPr id="74" name="Rectangle 73"/>
+            <p:cNvSpPr/>
+            <p:nvPr/>
+          </p:nvSpPr>
+          <p:spPr>
+            <a:xfrm>
+              <a:off x="8237257" y="2067688"/>
+              <a:ext cx="368300" cy="342900"/>
+            </a:xfrm>
+            <a:prstGeom prst="rect">
+              <a:avLst/>
+            </a:prstGeom>
+            <a:solidFill>
+              <a:schemeClr val="tx1">
+                <a:lumMod val="95000"/>
+              </a:schemeClr>
+            </a:solidFill>
+            <a:ln>
+              <a:noFill/>
+            </a:ln>
+            <a:scene3d>
+              <a:camera prst="orthographicFront"/>
+              <a:lightRig rig="threePt" dir="t"/>
+            </a:scene3d>
+            <a:sp3d>
+              <a:bevelT/>
+            </a:sp3d>
+          </p:spPr>
+          <p:style>
+            <a:lnRef idx="2">
+              <a:schemeClr val="accent1">
+                <a:shade val="50000"/>
+              </a:schemeClr>
+            </a:lnRef>
+            <a:fillRef idx="1">
+              <a:schemeClr val="accent1"/>
+            </a:fillRef>
+            <a:effectRef idx="0">
+              <a:schemeClr val="accent1"/>
+            </a:effectRef>
+            <a:fontRef idx="minor">
+              <a:schemeClr val="lt1"/>
+            </a:fontRef>
+          </p:style>
+          <p:txBody>
+            <a:bodyPr rtlCol="0" anchor="ctr"/>
+            <a:lstStyle/>
+            <a:p>
+              <a:pPr algn="ctr"/>
+              <a:endParaRPr lang="en-US" sz="1400" dirty="0"/>
+            </a:p>
+          </p:txBody>
+        </p:sp>
+        <p:sp>
+          <p:nvSpPr>
+            <p:cNvPr id="75" name="Rectangle 74"/>
+            <p:cNvSpPr/>
+            <p:nvPr/>
+          </p:nvSpPr>
+          <p:spPr>
+            <a:xfrm>
+              <a:off x="8656693" y="2062658"/>
+              <a:ext cx="368300" cy="342900"/>
+            </a:xfrm>
+            <a:prstGeom prst="rect">
+              <a:avLst/>
+            </a:prstGeom>
+            <a:solidFill>
+              <a:schemeClr val="tx1">
+                <a:lumMod val="95000"/>
+              </a:schemeClr>
+            </a:solidFill>
+            <a:ln>
+              <a:noFill/>
+            </a:ln>
+            <a:scene3d>
+              <a:camera prst="orthographicFront"/>
+              <a:lightRig rig="threePt" dir="t"/>
+            </a:scene3d>
+            <a:sp3d>
+              <a:bevelT/>
+            </a:sp3d>
+          </p:spPr>
+          <p:style>
+            <a:lnRef idx="2">
+              <a:schemeClr val="accent1">
+                <a:shade val="50000"/>
+              </a:schemeClr>
+            </a:lnRef>
+            <a:fillRef idx="1">
+              <a:schemeClr val="accent1"/>
+            </a:fillRef>
+            <a:effectRef idx="0">
+              <a:schemeClr val="accent1"/>
+            </a:effectRef>
+            <a:fontRef idx="minor">
+              <a:schemeClr val="lt1"/>
+            </a:fontRef>
+          </p:style>
+          <p:txBody>
+            <a:bodyPr rtlCol="0" anchor="ctr"/>
+            <a:lstStyle/>
+            <a:p>
+              <a:pPr algn="ctr"/>
+              <a:endParaRPr lang="en-US" sz="1400" dirty="0"/>
+            </a:p>
+          </p:txBody>
+        </p:sp>
+        <p:sp>
+          <p:nvSpPr>
+            <p:cNvPr id="76" name="Rectangle 75"/>
+            <p:cNvSpPr/>
+            <p:nvPr/>
+          </p:nvSpPr>
+          <p:spPr>
+            <a:xfrm>
+              <a:off x="7366000" y="2511183"/>
+              <a:ext cx="368300" cy="342900"/>
+            </a:xfrm>
+            <a:prstGeom prst="rect">
+              <a:avLst/>
+            </a:prstGeom>
+            <a:solidFill>
+              <a:schemeClr val="tx1">
+                <a:lumMod val="95000"/>
+              </a:schemeClr>
+            </a:solidFill>
+            <a:ln>
+              <a:noFill/>
+            </a:ln>
+            <a:scene3d>
+              <a:camera prst="orthographicFront"/>
+              <a:lightRig rig="threePt" dir="t"/>
+            </a:scene3d>
+            <a:sp3d>
+              <a:bevelT/>
+            </a:sp3d>
+          </p:spPr>
+          <p:style>
+            <a:lnRef idx="2">
+              <a:schemeClr val="accent1">
+                <a:shade val="50000"/>
+              </a:schemeClr>
+            </a:lnRef>
+            <a:fillRef idx="1">
+              <a:schemeClr val="accent1"/>
+            </a:fillRef>
+            <a:effectRef idx="0">
+              <a:schemeClr val="accent1"/>
+            </a:effectRef>
+            <a:fontRef idx="minor">
+              <a:schemeClr val="lt1"/>
+            </a:fontRef>
+          </p:style>
+          <p:txBody>
+            <a:bodyPr rtlCol="0" anchor="ctr"/>
+            <a:lstStyle/>
+            <a:p>
+              <a:pPr algn="ctr"/>
+              <a:endParaRPr lang="en-US" sz="1400" dirty="0"/>
+            </a:p>
+          </p:txBody>
+        </p:sp>
+        <p:sp>
+          <p:nvSpPr>
+            <p:cNvPr id="77" name="Rectangle 76"/>
+            <p:cNvSpPr/>
+            <p:nvPr/>
+          </p:nvSpPr>
+          <p:spPr>
+            <a:xfrm>
+              <a:off x="7805131" y="2511183"/>
+              <a:ext cx="368300" cy="342900"/>
+            </a:xfrm>
+            <a:prstGeom prst="rect">
+              <a:avLst/>
+            </a:prstGeom>
+            <a:solidFill>
+              <a:schemeClr val="tx1">
+                <a:lumMod val="95000"/>
+              </a:schemeClr>
+            </a:solidFill>
+            <a:ln>
+              <a:noFill/>
+            </a:ln>
+            <a:scene3d>
+              <a:camera prst="orthographicFront"/>
+              <a:lightRig rig="threePt" dir="t"/>
+            </a:scene3d>
+            <a:sp3d>
+              <a:bevelT/>
+            </a:sp3d>
+          </p:spPr>
+          <p:style>
+            <a:lnRef idx="2">
+              <a:schemeClr val="accent1">
+                <a:shade val="50000"/>
+              </a:schemeClr>
+            </a:lnRef>
+            <a:fillRef idx="1">
+              <a:schemeClr val="accent1"/>
+            </a:fillRef>
+            <a:effectRef idx="0">
+              <a:schemeClr val="accent1"/>
+            </a:effectRef>
+            <a:fontRef idx="minor">
+              <a:schemeClr val="lt1"/>
+            </a:fontRef>
+          </p:style>
+          <p:txBody>
+            <a:bodyPr rtlCol="0" anchor="ctr"/>
+            <a:lstStyle/>
+            <a:p>
+              <a:pPr algn="ctr"/>
+              <a:endParaRPr lang="en-US" sz="1400" dirty="0"/>
+            </a:p>
+          </p:txBody>
+        </p:sp>
+        <p:sp>
+          <p:nvSpPr>
+            <p:cNvPr id="78" name="Rectangle 77"/>
+            <p:cNvSpPr/>
+            <p:nvPr/>
+          </p:nvSpPr>
+          <p:spPr>
+            <a:xfrm>
+              <a:off x="8231869" y="2511183"/>
+              <a:ext cx="368300" cy="342900"/>
+            </a:xfrm>
+            <a:prstGeom prst="rect">
+              <a:avLst/>
+            </a:prstGeom>
+            <a:solidFill>
+              <a:schemeClr val="tx1">
+                <a:lumMod val="95000"/>
+              </a:schemeClr>
+            </a:solidFill>
+            <a:ln>
+              <a:noFill/>
+            </a:ln>
+            <a:scene3d>
+              <a:camera prst="orthographicFront"/>
+              <a:lightRig rig="threePt" dir="t"/>
+            </a:scene3d>
+            <a:sp3d>
+              <a:bevelT/>
+            </a:sp3d>
+          </p:spPr>
+          <p:style>
+            <a:lnRef idx="2">
+              <a:schemeClr val="accent1">
+                <a:shade val="50000"/>
+              </a:schemeClr>
+            </a:lnRef>
+            <a:fillRef idx="1">
+              <a:schemeClr val="accent1"/>
+            </a:fillRef>
+            <a:effectRef idx="0">
+              <a:schemeClr val="accent1"/>
+            </a:effectRef>
+            <a:fontRef idx="minor">
+              <a:schemeClr val="lt1"/>
+            </a:fontRef>
+          </p:style>
+          <p:txBody>
+            <a:bodyPr rtlCol="0" anchor="ctr"/>
+            <a:lstStyle/>
+            <a:p>
+              <a:pPr algn="ctr"/>
+              <a:endParaRPr lang="en-US" sz="1400" dirty="0"/>
+            </a:p>
+          </p:txBody>
+        </p:sp>
+      </p:grpSp>
+      <p:grpSp>
+        <p:nvGrpSpPr>
+          <p:cNvPr id="6" name="Group 5"/>
+          <p:cNvGrpSpPr/>
+          <p:nvPr/>
+        </p:nvGrpSpPr>
+        <p:grpSpPr>
+          <a:xfrm>
+            <a:off x="112408" y="949971"/>
+            <a:ext cx="2565855" cy="2302677"/>
+            <a:chOff x="-1344595" y="663669"/>
+            <a:chExt cx="3243889" cy="3140877"/>
+          </a:xfrm>
+        </p:grpSpPr>
+        <p:sp>
+          <p:nvSpPr>
+            <p:cNvPr id="64" name="Isosceles Triangle 63"/>
+            <p:cNvSpPr/>
+            <p:nvPr/>
+          </p:nvSpPr>
+          <p:spPr>
+            <a:xfrm>
+              <a:off x="-949603" y="1094454"/>
+              <a:ext cx="2453906" cy="871351"/>
+            </a:xfrm>
+            <a:prstGeom prst="triangle">
+              <a:avLst>
+                <a:gd name="adj" fmla="val 52147"/>
+              </a:avLst>
+            </a:prstGeom>
+            <a:solidFill>
+              <a:schemeClr val="tx1">
+                <a:lumMod val="85000"/>
+              </a:schemeClr>
+            </a:solidFill>
+            <a:ln>
+              <a:solidFill>
+                <a:schemeClr val="tx1">
+                  <a:lumMod val="50000"/>
+                </a:schemeClr>
+              </a:solidFill>
+            </a:ln>
+            <a:scene3d>
+              <a:camera prst="orthographicFront"/>
+              <a:lightRig rig="threePt" dir="t"/>
+            </a:scene3d>
+            <a:sp3d>
+              <a:bevelT w="152400" h="50800" prst="softRound"/>
+            </a:sp3d>
+          </p:spPr>
+          <p:style>
+            <a:lnRef idx="2">
+              <a:schemeClr val="accent1">
+                <a:shade val="50000"/>
+              </a:schemeClr>
+            </a:lnRef>
+            <a:fillRef idx="1">
+              <a:schemeClr val="accent1"/>
+            </a:fillRef>
+            <a:effectRef idx="0">
+              <a:schemeClr val="accent1"/>
+            </a:effectRef>
+            <a:fontRef idx="minor">
+              <a:schemeClr val="lt1"/>
+            </a:fontRef>
+          </p:style>
+          <p:txBody>
+            <a:bodyPr rtlCol="0" anchor="ctr"/>
+            <a:lstStyle/>
+            <a:p>
+              <a:pPr algn="ctr"/>
+              <a:endParaRPr lang="en-US"/>
+            </a:p>
+          </p:txBody>
+        </p:sp>
+        <p:sp>
+          <p:nvSpPr>
+            <p:cNvPr id="65" name="Rectangle 64"/>
+            <p:cNvSpPr/>
+            <p:nvPr/>
+          </p:nvSpPr>
+          <p:spPr>
+            <a:xfrm>
+              <a:off x="-572753" y="2079593"/>
+              <a:ext cx="1651825" cy="1101396"/>
+            </a:xfrm>
+            <a:prstGeom prst="rect">
+              <a:avLst/>
+            </a:prstGeom>
+            <a:solidFill>
+              <a:schemeClr val="tx1">
+                <a:lumMod val="85000"/>
+              </a:schemeClr>
+            </a:solidFill>
+            <a:ln>
+              <a:solidFill>
+                <a:schemeClr val="tx1">
+                  <a:lumMod val="50000"/>
+                </a:schemeClr>
+              </a:solidFill>
+            </a:ln>
+            <a:scene3d>
+              <a:camera prst="orthographicFront"/>
+              <a:lightRig rig="threePt" dir="t"/>
+            </a:scene3d>
+            <a:sp3d>
+              <a:bevelT w="152400" h="50800" prst="softRound"/>
+            </a:sp3d>
+          </p:spPr>
+          <p:style>
+            <a:lnRef idx="2">
+              <a:schemeClr val="accent1">
+                <a:shade val="50000"/>
+              </a:schemeClr>
+            </a:lnRef>
+            <a:fillRef idx="1">
+              <a:schemeClr val="accent1"/>
+            </a:fillRef>
+            <a:effectRef idx="0">
+              <a:schemeClr val="accent1"/>
+            </a:effectRef>
+            <a:fontRef idx="minor">
+              <a:schemeClr val="lt1"/>
+            </a:fontRef>
+          </p:style>
+          <p:txBody>
+            <a:bodyPr rtlCol="0" anchor="ctr"/>
+            <a:lstStyle/>
+            <a:p>
+              <a:pPr algn="ctr"/>
+              <a:endParaRPr lang="en-US" dirty="0"/>
+            </a:p>
+          </p:txBody>
+        </p:sp>
+        <p:sp>
+          <p:nvSpPr>
+            <p:cNvPr id="81" name="Oval 80"/>
+            <p:cNvSpPr/>
+            <p:nvPr/>
+          </p:nvSpPr>
+          <p:spPr>
+            <a:xfrm>
+              <a:off x="-1344595" y="663669"/>
+              <a:ext cx="3243889" cy="3140877"/>
+            </a:xfrm>
+            <a:prstGeom prst="ellipse">
+              <a:avLst/>
+            </a:prstGeom>
+            <a:noFill/>
+            <a:ln w="76200">
+              <a:solidFill>
+                <a:schemeClr val="tx1"/>
+              </a:solidFill>
+            </a:ln>
+            <a:scene3d>
+              <a:camera prst="orthographicFront"/>
+              <a:lightRig rig="chilly" dir="t"/>
+            </a:scene3d>
+            <a:sp3d>
+              <a:bevelT w="152400" h="50800" prst="softRound"/>
+            </a:sp3d>
+          </p:spPr>
+          <p:style>
+            <a:lnRef idx="2">
+              <a:schemeClr val="accent1">
+                <a:shade val="50000"/>
+              </a:schemeClr>
+            </a:lnRef>
+            <a:fillRef idx="1">
+              <a:schemeClr val="accent1"/>
+            </a:fillRef>
+            <a:effectRef idx="0">
+              <a:schemeClr val="accent1"/>
+            </a:effectRef>
+            <a:fontRef idx="minor">
+              <a:schemeClr val="lt1"/>
+            </a:fontRef>
+          </p:style>
+          <p:txBody>
+            <a:bodyPr rtlCol="0" anchor="ctr"/>
+            <a:lstStyle/>
+            <a:p>
+              <a:pPr algn="ctr"/>
+              <a:endParaRPr lang="en-US"/>
+            </a:p>
+          </p:txBody>
+        </p:sp>
+      </p:grpSp>
+      <p:grpSp>
+        <p:nvGrpSpPr>
+          <p:cNvPr id="5" name="Group 4"/>
+          <p:cNvGrpSpPr/>
+          <p:nvPr/>
+        </p:nvGrpSpPr>
+        <p:grpSpPr>
+          <a:xfrm>
+            <a:off x="3125925" y="949971"/>
+            <a:ext cx="2456128" cy="2304713"/>
+            <a:chOff x="2398852" y="622135"/>
+            <a:chExt cx="3243889" cy="3140877"/>
+          </a:xfrm>
+        </p:grpSpPr>
+        <p:sp>
+          <p:nvSpPr>
+            <p:cNvPr id="2" name="Right Arrow 1"/>
+            <p:cNvSpPr/>
+            <p:nvPr/>
+          </p:nvSpPr>
+          <p:spPr>
+            <a:xfrm rot="10800000">
+              <a:off x="2877484" y="1005752"/>
+              <a:ext cx="2145729" cy="2429568"/>
+            </a:xfrm>
+            <a:prstGeom prst="rightArrow">
+              <a:avLst/>
+            </a:prstGeom>
+            <a:solidFill>
+              <a:schemeClr val="tx1">
+                <a:lumMod val="95000"/>
+              </a:schemeClr>
+            </a:solidFill>
+            <a:ln>
+              <a:solidFill>
+                <a:schemeClr val="tx1">
+                  <a:lumMod val="85000"/>
+                </a:schemeClr>
+              </a:solidFill>
+            </a:ln>
+            <a:scene3d>
+              <a:camera prst="orthographicFront"/>
+              <a:lightRig rig="chilly" dir="t"/>
+            </a:scene3d>
+            <a:sp3d>
+              <a:bevelT w="152400" h="50800" prst="softRound"/>
+            </a:sp3d>
+          </p:spPr>
+          <p:style>
+            <a:lnRef idx="2">
+              <a:schemeClr val="accent1">
+                <a:shade val="50000"/>
+              </a:schemeClr>
+            </a:lnRef>
+            <a:fillRef idx="1">
+              <a:schemeClr val="accent1"/>
+            </a:fillRef>
+            <a:effectRef idx="0">
+              <a:schemeClr val="accent1"/>
+            </a:effectRef>
+            <a:fontRef idx="minor">
+              <a:schemeClr val="lt1"/>
+            </a:fontRef>
+          </p:style>
+          <p:txBody>
+            <a:bodyPr rtlCol="0" anchor="ctr"/>
+            <a:lstStyle/>
+            <a:p>
+              <a:pPr algn="ctr"/>
+              <a:endParaRPr lang="en-US"/>
+            </a:p>
+          </p:txBody>
+        </p:sp>
+        <p:sp>
+          <p:nvSpPr>
+            <p:cNvPr id="85" name="Oval 84"/>
+            <p:cNvSpPr/>
+            <p:nvPr/>
+          </p:nvSpPr>
+          <p:spPr>
+            <a:xfrm>
+              <a:off x="2398852" y="622135"/>
+              <a:ext cx="3243889" cy="3140877"/>
+            </a:xfrm>
+            <a:prstGeom prst="ellipse">
+              <a:avLst/>
+            </a:prstGeom>
+            <a:noFill/>
+            <a:ln w="76200">
+              <a:solidFill>
+                <a:schemeClr val="tx1"/>
+              </a:solidFill>
+            </a:ln>
+            <a:scene3d>
+              <a:camera prst="orthographicFront"/>
+              <a:lightRig rig="chilly" dir="t"/>
+            </a:scene3d>
+            <a:sp3d>
+              <a:bevelT w="152400" h="50800" prst="softRound"/>
+            </a:sp3d>
           </p:spPr>
           <p:style>
             <a:lnRef idx="2">

</xml_diff>

<commit_message>
Added navigation buttons on the HUD to challenges menu, pattern viewer,  pausing the game e.t.c
</commit_message>
<xml_diff>
--- a/docs/designs/menu.pptx
+++ b/docs/designs/menu.pptx
@@ -10,6 +10,7 @@
     <p:sldId id="258" r:id="rId4"/>
     <p:sldId id="259" r:id="rId5"/>
     <p:sldId id="260" r:id="rId6"/>
+    <p:sldId id="261" r:id="rId7"/>
   </p:sldIdLst>
   <p:sldSz cx="12192000" cy="6858000"/>
   <p:notesSz cx="6858000" cy="9144000"/>
@@ -247,7 +248,7 @@
           <a:p>
             <a:fld id="{E8FA1CFD-67F9-4333-BA11-E82133BFD29A}" type="datetimeFigureOut">
               <a:rPr lang="en-US" smtClean="0"/>
-              <a:t>7/20/2018</a:t>
+              <a:t>8/9/2018</a:t>
             </a:fld>
             <a:endParaRPr lang="en-US"/>
           </a:p>
@@ -417,7 +418,7 @@
           <a:p>
             <a:fld id="{E8FA1CFD-67F9-4333-BA11-E82133BFD29A}" type="datetimeFigureOut">
               <a:rPr lang="en-US" smtClean="0"/>
-              <a:t>7/20/2018</a:t>
+              <a:t>8/9/2018</a:t>
             </a:fld>
             <a:endParaRPr lang="en-US"/>
           </a:p>
@@ -597,7 +598,7 @@
           <a:p>
             <a:fld id="{E8FA1CFD-67F9-4333-BA11-E82133BFD29A}" type="datetimeFigureOut">
               <a:rPr lang="en-US" smtClean="0"/>
-              <a:t>7/20/2018</a:t>
+              <a:t>8/9/2018</a:t>
             </a:fld>
             <a:endParaRPr lang="en-US"/>
           </a:p>
@@ -767,7 +768,7 @@
           <a:p>
             <a:fld id="{E8FA1CFD-67F9-4333-BA11-E82133BFD29A}" type="datetimeFigureOut">
               <a:rPr lang="en-US" smtClean="0"/>
-              <a:t>7/20/2018</a:t>
+              <a:t>8/9/2018</a:t>
             </a:fld>
             <a:endParaRPr lang="en-US"/>
           </a:p>
@@ -1013,7 +1014,7 @@
           <a:p>
             <a:fld id="{E8FA1CFD-67F9-4333-BA11-E82133BFD29A}" type="datetimeFigureOut">
               <a:rPr lang="en-US" smtClean="0"/>
-              <a:t>7/20/2018</a:t>
+              <a:t>8/9/2018</a:t>
             </a:fld>
             <a:endParaRPr lang="en-US"/>
           </a:p>
@@ -1245,7 +1246,7 @@
           <a:p>
             <a:fld id="{E8FA1CFD-67F9-4333-BA11-E82133BFD29A}" type="datetimeFigureOut">
               <a:rPr lang="en-US" smtClean="0"/>
-              <a:t>7/20/2018</a:t>
+              <a:t>8/9/2018</a:t>
             </a:fld>
             <a:endParaRPr lang="en-US"/>
           </a:p>
@@ -1612,7 +1613,7 @@
           <a:p>
             <a:fld id="{E8FA1CFD-67F9-4333-BA11-E82133BFD29A}" type="datetimeFigureOut">
               <a:rPr lang="en-US" smtClean="0"/>
-              <a:t>7/20/2018</a:t>
+              <a:t>8/9/2018</a:t>
             </a:fld>
             <a:endParaRPr lang="en-US"/>
           </a:p>
@@ -1730,7 +1731,7 @@
           <a:p>
             <a:fld id="{E8FA1CFD-67F9-4333-BA11-E82133BFD29A}" type="datetimeFigureOut">
               <a:rPr lang="en-US" smtClean="0"/>
-              <a:t>7/20/2018</a:t>
+              <a:t>8/9/2018</a:t>
             </a:fld>
             <a:endParaRPr lang="en-US"/>
           </a:p>
@@ -1825,7 +1826,7 @@
           <a:p>
             <a:fld id="{E8FA1CFD-67F9-4333-BA11-E82133BFD29A}" type="datetimeFigureOut">
               <a:rPr lang="en-US" smtClean="0"/>
-              <a:t>7/20/2018</a:t>
+              <a:t>8/9/2018</a:t>
             </a:fld>
             <a:endParaRPr lang="en-US"/>
           </a:p>
@@ -2102,7 +2103,7 @@
           <a:p>
             <a:fld id="{E8FA1CFD-67F9-4333-BA11-E82133BFD29A}" type="datetimeFigureOut">
               <a:rPr lang="en-US" smtClean="0"/>
-              <a:t>7/20/2018</a:t>
+              <a:t>8/9/2018</a:t>
             </a:fld>
             <a:endParaRPr lang="en-US"/>
           </a:p>
@@ -2359,7 +2360,7 @@
           <a:p>
             <a:fld id="{E8FA1CFD-67F9-4333-BA11-E82133BFD29A}" type="datetimeFigureOut">
               <a:rPr lang="en-US" smtClean="0"/>
-              <a:t>7/20/2018</a:t>
+              <a:t>8/9/2018</a:t>
             </a:fld>
             <a:endParaRPr lang="en-US"/>
           </a:p>
@@ -2572,7 +2573,7 @@
           <a:p>
             <a:fld id="{E8FA1CFD-67F9-4333-BA11-E82133BFD29A}" type="datetimeFigureOut">
               <a:rPr lang="en-US" smtClean="0"/>
-              <a:t>7/20/2018</a:t>
+              <a:t>8/9/2018</a:t>
             </a:fld>
             <a:endParaRPr lang="en-US"/>
           </a:p>
@@ -8296,6 +8297,317 @@
 </p:sld>
 </file>
 
+<file path=ppt/slides/slide6.xml><?xml version="1.0" encoding="utf-8"?>
+<p:sld xmlns:a="http://schemas.openxmlformats.org/drawingml/2006/main" xmlns:r="http://schemas.openxmlformats.org/officeDocument/2006/relationships" xmlns:p="http://schemas.openxmlformats.org/presentationml/2006/main">
+  <p:cSld>
+    <p:spTree>
+      <p:nvGrpSpPr>
+        <p:cNvPr id="1" name=""/>
+        <p:cNvGrpSpPr/>
+        <p:nvPr/>
+      </p:nvGrpSpPr>
+      <p:grpSpPr>
+        <a:xfrm>
+          <a:off x="0" y="0"/>
+          <a:ext cx="0" cy="0"/>
+          <a:chOff x="0" y="0"/>
+          <a:chExt cx="0" cy="0"/>
+        </a:xfrm>
+      </p:grpSpPr>
+      <p:sp>
+        <p:nvSpPr>
+          <p:cNvPr id="7" name="Oval 6"/>
+          <p:cNvSpPr/>
+          <p:nvPr/>
+        </p:nvSpPr>
+        <p:spPr>
+          <a:xfrm>
+            <a:off x="3008008" y="1902471"/>
+            <a:ext cx="2565855" cy="2302677"/>
+          </a:xfrm>
+          <a:prstGeom prst="ellipse">
+            <a:avLst/>
+          </a:prstGeom>
+          <a:noFill/>
+          <a:ln w="76200">
+            <a:solidFill>
+              <a:schemeClr val="tx1"/>
+            </a:solidFill>
+          </a:ln>
+          <a:scene3d>
+            <a:camera prst="orthographicFront"/>
+            <a:lightRig rig="chilly" dir="t"/>
+          </a:scene3d>
+          <a:sp3d>
+            <a:bevelT w="152400" h="50800" prst="softRound"/>
+          </a:sp3d>
+        </p:spPr>
+        <p:style>
+          <a:lnRef idx="2">
+            <a:schemeClr val="accent1">
+              <a:shade val="50000"/>
+            </a:schemeClr>
+          </a:lnRef>
+          <a:fillRef idx="1">
+            <a:schemeClr val="accent1"/>
+          </a:fillRef>
+          <a:effectRef idx="0">
+            <a:schemeClr val="accent1"/>
+          </a:effectRef>
+          <a:fontRef idx="minor">
+            <a:schemeClr val="lt1"/>
+          </a:fontRef>
+        </p:style>
+        <p:txBody>
+          <a:bodyPr rtlCol="0" anchor="ctr"/>
+          <a:lstStyle/>
+          <a:p>
+            <a:pPr algn="ctr"/>
+            <a:endParaRPr lang="en-US"/>
+          </a:p>
+        </p:txBody>
+      </p:sp>
+      <p:sp>
+        <p:nvSpPr>
+          <p:cNvPr id="8" name="U-Turn Arrow 7"/>
+          <p:cNvSpPr/>
+          <p:nvPr/>
+        </p:nvSpPr>
+        <p:spPr>
+          <a:xfrm rot="16200000">
+            <a:off x="3386141" y="2391821"/>
+            <a:ext cx="1562100" cy="1190626"/>
+          </a:xfrm>
+          <a:prstGeom prst="uturnArrow">
+            <a:avLst>
+              <a:gd name="adj1" fmla="val 25877"/>
+              <a:gd name="adj2" fmla="val 25000"/>
+              <a:gd name="adj3" fmla="val 25000"/>
+              <a:gd name="adj4" fmla="val 50000"/>
+              <a:gd name="adj5" fmla="val 100000"/>
+            </a:avLst>
+          </a:prstGeom>
+          <a:solidFill>
+            <a:schemeClr val="tx1"/>
+          </a:solidFill>
+          <a:ln>
+            <a:solidFill>
+              <a:schemeClr val="tx1"/>
+            </a:solidFill>
+          </a:ln>
+          <a:scene3d>
+            <a:camera prst="orthographicFront"/>
+            <a:lightRig rig="threePt" dir="t"/>
+          </a:scene3d>
+          <a:sp3d>
+            <a:bevelT/>
+          </a:sp3d>
+        </p:spPr>
+        <p:style>
+          <a:lnRef idx="2">
+            <a:schemeClr val="accent1">
+              <a:shade val="50000"/>
+            </a:schemeClr>
+          </a:lnRef>
+          <a:fillRef idx="1">
+            <a:schemeClr val="accent1"/>
+          </a:fillRef>
+          <a:effectRef idx="0">
+            <a:schemeClr val="accent1"/>
+          </a:effectRef>
+          <a:fontRef idx="minor">
+            <a:schemeClr val="lt1"/>
+          </a:fontRef>
+        </p:style>
+        <p:txBody>
+          <a:bodyPr rtlCol="0" anchor="ctr"/>
+          <a:lstStyle/>
+          <a:p>
+            <a:pPr algn="ctr"/>
+            <a:endParaRPr lang="en-US">
+              <a:solidFill>
+                <a:schemeClr val="tx1"/>
+              </a:solidFill>
+            </a:endParaRPr>
+          </a:p>
+        </p:txBody>
+      </p:sp>
+      <p:sp>
+        <p:nvSpPr>
+          <p:cNvPr id="9" name="Oval 8"/>
+          <p:cNvSpPr/>
+          <p:nvPr/>
+        </p:nvSpPr>
+        <p:spPr>
+          <a:xfrm>
+            <a:off x="6408433" y="1988196"/>
+            <a:ext cx="2565855" cy="2302677"/>
+          </a:xfrm>
+          <a:prstGeom prst="ellipse">
+            <a:avLst/>
+          </a:prstGeom>
+          <a:noFill/>
+          <a:ln w="76200">
+            <a:solidFill>
+              <a:schemeClr val="tx1"/>
+            </a:solidFill>
+          </a:ln>
+          <a:scene3d>
+            <a:camera prst="orthographicFront"/>
+            <a:lightRig rig="chilly" dir="t"/>
+          </a:scene3d>
+          <a:sp3d>
+            <a:bevelT w="152400" h="50800" prst="softRound"/>
+          </a:sp3d>
+        </p:spPr>
+        <p:style>
+          <a:lnRef idx="2">
+            <a:schemeClr val="accent1">
+              <a:shade val="50000"/>
+            </a:schemeClr>
+          </a:lnRef>
+          <a:fillRef idx="1">
+            <a:schemeClr val="accent1"/>
+          </a:fillRef>
+          <a:effectRef idx="0">
+            <a:schemeClr val="accent1"/>
+          </a:effectRef>
+          <a:fontRef idx="minor">
+            <a:schemeClr val="lt1"/>
+          </a:fontRef>
+        </p:style>
+        <p:txBody>
+          <a:bodyPr rtlCol="0" anchor="ctr"/>
+          <a:lstStyle/>
+          <a:p>
+            <a:pPr algn="ctr"/>
+            <a:endParaRPr lang="en-US"/>
+          </a:p>
+        </p:txBody>
+      </p:sp>
+      <p:sp>
+        <p:nvSpPr>
+          <p:cNvPr id="12" name="Rectangle 11"/>
+          <p:cNvSpPr/>
+          <p:nvPr/>
+        </p:nvSpPr>
+        <p:spPr>
+          <a:xfrm>
+            <a:off x="7019925" y="2419350"/>
+            <a:ext cx="533400" cy="1495425"/>
+          </a:xfrm>
+          <a:prstGeom prst="rect">
+            <a:avLst/>
+          </a:prstGeom>
+          <a:solidFill>
+            <a:schemeClr val="tx1"/>
+          </a:solidFill>
+          <a:ln>
+            <a:solidFill>
+              <a:schemeClr val="tx1"/>
+            </a:solidFill>
+          </a:ln>
+          <a:scene3d>
+            <a:camera prst="orthographicFront"/>
+            <a:lightRig rig="threePt" dir="t"/>
+          </a:scene3d>
+          <a:sp3d>
+            <a:bevelT/>
+          </a:sp3d>
+        </p:spPr>
+        <p:style>
+          <a:lnRef idx="2">
+            <a:schemeClr val="accent1">
+              <a:shade val="50000"/>
+            </a:schemeClr>
+          </a:lnRef>
+          <a:fillRef idx="1">
+            <a:schemeClr val="accent1"/>
+          </a:fillRef>
+          <a:effectRef idx="0">
+            <a:schemeClr val="accent1"/>
+          </a:effectRef>
+          <a:fontRef idx="minor">
+            <a:schemeClr val="lt1"/>
+          </a:fontRef>
+        </p:style>
+        <p:txBody>
+          <a:bodyPr rtlCol="0" anchor="ctr"/>
+          <a:lstStyle/>
+          <a:p>
+            <a:pPr algn="ctr"/>
+            <a:endParaRPr lang="en-US"/>
+          </a:p>
+        </p:txBody>
+      </p:sp>
+      <p:sp>
+        <p:nvSpPr>
+          <p:cNvPr id="13" name="Rectangle 12"/>
+          <p:cNvSpPr/>
+          <p:nvPr/>
+        </p:nvSpPr>
+        <p:spPr>
+          <a:xfrm>
+            <a:off x="7854495" y="2419350"/>
+            <a:ext cx="533400" cy="1495425"/>
+          </a:xfrm>
+          <a:prstGeom prst="rect">
+            <a:avLst/>
+          </a:prstGeom>
+          <a:solidFill>
+            <a:schemeClr val="tx1"/>
+          </a:solidFill>
+          <a:ln>
+            <a:solidFill>
+              <a:schemeClr val="tx1"/>
+            </a:solidFill>
+          </a:ln>
+          <a:scene3d>
+            <a:camera prst="orthographicFront"/>
+            <a:lightRig rig="threePt" dir="t"/>
+          </a:scene3d>
+          <a:sp3d>
+            <a:bevelT/>
+          </a:sp3d>
+        </p:spPr>
+        <p:style>
+          <a:lnRef idx="2">
+            <a:schemeClr val="accent1">
+              <a:shade val="50000"/>
+            </a:schemeClr>
+          </a:lnRef>
+          <a:fillRef idx="1">
+            <a:schemeClr val="accent1"/>
+          </a:fillRef>
+          <a:effectRef idx="0">
+            <a:schemeClr val="accent1"/>
+          </a:effectRef>
+          <a:fontRef idx="minor">
+            <a:schemeClr val="lt1"/>
+          </a:fontRef>
+        </p:style>
+        <p:txBody>
+          <a:bodyPr rtlCol="0" anchor="ctr"/>
+          <a:lstStyle/>
+          <a:p>
+            <a:pPr algn="ctr"/>
+            <a:endParaRPr lang="en-US"/>
+          </a:p>
+        </p:txBody>
+      </p:sp>
+    </p:spTree>
+    <p:extLst>
+      <p:ext uri="{BB962C8B-B14F-4D97-AF65-F5344CB8AC3E}">
+        <p14:creationId xmlns:p14="http://schemas.microsoft.com/office/powerpoint/2010/main" val="1120046436"/>
+      </p:ext>
+    </p:extLst>
+  </p:cSld>
+  <p:clrMapOvr>
+    <a:masterClrMapping/>
+  </p:clrMapOvr>
+</p:sld>
+</file>
+
 <file path=ppt/theme/theme1.xml><?xml version="1.0" encoding="utf-8"?>
 <a:theme xmlns:a="http://schemas.openxmlformats.org/drawingml/2006/main" name="Office Theme">
   <a:themeElements>

</xml_diff>

<commit_message>
All dialogues are now under one scene
enhanced the canvas class to clear positionNodes of active objects when placing a new one
</commit_message>
<xml_diff>
--- a/docs/designs/menu.pptx
+++ b/docs/designs/menu.pptx
@@ -11,6 +11,7 @@
     <p:sldId id="259" r:id="rId5"/>
     <p:sldId id="260" r:id="rId6"/>
     <p:sldId id="261" r:id="rId7"/>
+    <p:sldId id="262" r:id="rId8"/>
   </p:sldIdLst>
   <p:sldSz cx="12192000" cy="6858000"/>
   <p:notesSz cx="6858000" cy="9144000"/>
@@ -248,7 +249,7 @@
           <a:p>
             <a:fld id="{E8FA1CFD-67F9-4333-BA11-E82133BFD29A}" type="datetimeFigureOut">
               <a:rPr lang="en-US" smtClean="0"/>
-              <a:t>8/9/2018</a:t>
+              <a:t>8/10/2018</a:t>
             </a:fld>
             <a:endParaRPr lang="en-US"/>
           </a:p>
@@ -418,7 +419,7 @@
           <a:p>
             <a:fld id="{E8FA1CFD-67F9-4333-BA11-E82133BFD29A}" type="datetimeFigureOut">
               <a:rPr lang="en-US" smtClean="0"/>
-              <a:t>8/9/2018</a:t>
+              <a:t>8/10/2018</a:t>
             </a:fld>
             <a:endParaRPr lang="en-US"/>
           </a:p>
@@ -598,7 +599,7 @@
           <a:p>
             <a:fld id="{E8FA1CFD-67F9-4333-BA11-E82133BFD29A}" type="datetimeFigureOut">
               <a:rPr lang="en-US" smtClean="0"/>
-              <a:t>8/9/2018</a:t>
+              <a:t>8/10/2018</a:t>
             </a:fld>
             <a:endParaRPr lang="en-US"/>
           </a:p>
@@ -768,7 +769,7 @@
           <a:p>
             <a:fld id="{E8FA1CFD-67F9-4333-BA11-E82133BFD29A}" type="datetimeFigureOut">
               <a:rPr lang="en-US" smtClean="0"/>
-              <a:t>8/9/2018</a:t>
+              <a:t>8/10/2018</a:t>
             </a:fld>
             <a:endParaRPr lang="en-US"/>
           </a:p>
@@ -1014,7 +1015,7 @@
           <a:p>
             <a:fld id="{E8FA1CFD-67F9-4333-BA11-E82133BFD29A}" type="datetimeFigureOut">
               <a:rPr lang="en-US" smtClean="0"/>
-              <a:t>8/9/2018</a:t>
+              <a:t>8/10/2018</a:t>
             </a:fld>
             <a:endParaRPr lang="en-US"/>
           </a:p>
@@ -1246,7 +1247,7 @@
           <a:p>
             <a:fld id="{E8FA1CFD-67F9-4333-BA11-E82133BFD29A}" type="datetimeFigureOut">
               <a:rPr lang="en-US" smtClean="0"/>
-              <a:t>8/9/2018</a:t>
+              <a:t>8/10/2018</a:t>
             </a:fld>
             <a:endParaRPr lang="en-US"/>
           </a:p>
@@ -1613,7 +1614,7 @@
           <a:p>
             <a:fld id="{E8FA1CFD-67F9-4333-BA11-E82133BFD29A}" type="datetimeFigureOut">
               <a:rPr lang="en-US" smtClean="0"/>
-              <a:t>8/9/2018</a:t>
+              <a:t>8/10/2018</a:t>
             </a:fld>
             <a:endParaRPr lang="en-US"/>
           </a:p>
@@ -1731,7 +1732,7 @@
           <a:p>
             <a:fld id="{E8FA1CFD-67F9-4333-BA11-E82133BFD29A}" type="datetimeFigureOut">
               <a:rPr lang="en-US" smtClean="0"/>
-              <a:t>8/9/2018</a:t>
+              <a:t>8/10/2018</a:t>
             </a:fld>
             <a:endParaRPr lang="en-US"/>
           </a:p>
@@ -1826,7 +1827,7 @@
           <a:p>
             <a:fld id="{E8FA1CFD-67F9-4333-BA11-E82133BFD29A}" type="datetimeFigureOut">
               <a:rPr lang="en-US" smtClean="0"/>
-              <a:t>8/9/2018</a:t>
+              <a:t>8/10/2018</a:t>
             </a:fld>
             <a:endParaRPr lang="en-US"/>
           </a:p>
@@ -2103,7 +2104,7 @@
           <a:p>
             <a:fld id="{E8FA1CFD-67F9-4333-BA11-E82133BFD29A}" type="datetimeFigureOut">
               <a:rPr lang="en-US" smtClean="0"/>
-              <a:t>8/9/2018</a:t>
+              <a:t>8/10/2018</a:t>
             </a:fld>
             <a:endParaRPr lang="en-US"/>
           </a:p>
@@ -2360,7 +2361,7 @@
           <a:p>
             <a:fld id="{E8FA1CFD-67F9-4333-BA11-E82133BFD29A}" type="datetimeFigureOut">
               <a:rPr lang="en-US" smtClean="0"/>
-              <a:t>8/9/2018</a:t>
+              <a:t>8/10/2018</a:t>
             </a:fld>
             <a:endParaRPr lang="en-US"/>
           </a:p>
@@ -2573,7 +2574,7 @@
           <a:p>
             <a:fld id="{E8FA1CFD-67F9-4333-BA11-E82133BFD29A}" type="datetimeFigureOut">
               <a:rPr lang="en-US" smtClean="0"/>
-              <a:t>8/9/2018</a:t>
+              <a:t>8/10/2018</a:t>
             </a:fld>
             <a:endParaRPr lang="en-US"/>
           </a:p>
@@ -8608,6 +8609,255 @@
 </p:sld>
 </file>
 
+<file path=ppt/slides/slide7.xml><?xml version="1.0" encoding="utf-8"?>
+<p:sld xmlns:a="http://schemas.openxmlformats.org/drawingml/2006/main" xmlns:r="http://schemas.openxmlformats.org/officeDocument/2006/relationships" xmlns:p="http://schemas.openxmlformats.org/presentationml/2006/main">
+  <p:cSld>
+    <p:spTree>
+      <p:nvGrpSpPr>
+        <p:cNvPr id="1" name=""/>
+        <p:cNvGrpSpPr/>
+        <p:nvPr/>
+      </p:nvGrpSpPr>
+      <p:grpSpPr>
+        <a:xfrm>
+          <a:off x="0" y="0"/>
+          <a:ext cx="0" cy="0"/>
+          <a:chOff x="0" y="0"/>
+          <a:chExt cx="0" cy="0"/>
+        </a:xfrm>
+      </p:grpSpPr>
+      <p:sp>
+        <p:nvSpPr>
+          <p:cNvPr id="4" name="Oval 3"/>
+          <p:cNvSpPr/>
+          <p:nvPr/>
+        </p:nvSpPr>
+        <p:spPr>
+          <a:xfrm>
+            <a:off x="3008008" y="1902471"/>
+            <a:ext cx="2565855" cy="2302677"/>
+          </a:xfrm>
+          <a:prstGeom prst="ellipse">
+            <a:avLst/>
+          </a:prstGeom>
+          <a:noFill/>
+          <a:ln w="76200">
+            <a:solidFill>
+              <a:schemeClr val="tx1"/>
+            </a:solidFill>
+          </a:ln>
+          <a:scene3d>
+            <a:camera prst="orthographicFront"/>
+            <a:lightRig rig="chilly" dir="t"/>
+          </a:scene3d>
+          <a:sp3d>
+            <a:bevelT w="152400" h="50800" prst="softRound"/>
+          </a:sp3d>
+        </p:spPr>
+        <p:style>
+          <a:lnRef idx="2">
+            <a:schemeClr val="accent1">
+              <a:shade val="50000"/>
+            </a:schemeClr>
+          </a:lnRef>
+          <a:fillRef idx="1">
+            <a:schemeClr val="accent1"/>
+          </a:fillRef>
+          <a:effectRef idx="0">
+            <a:schemeClr val="accent1"/>
+          </a:effectRef>
+          <a:fontRef idx="minor">
+            <a:schemeClr val="lt1"/>
+          </a:fontRef>
+        </p:style>
+        <p:txBody>
+          <a:bodyPr rtlCol="0" anchor="ctr"/>
+          <a:lstStyle/>
+          <a:p>
+            <a:pPr algn="ctr"/>
+            <a:endParaRPr lang="en-US"/>
+          </a:p>
+        </p:txBody>
+      </p:sp>
+      <p:sp>
+        <p:nvSpPr>
+          <p:cNvPr id="7" name="L-Shape 6"/>
+          <p:cNvSpPr/>
+          <p:nvPr/>
+        </p:nvSpPr>
+        <p:spPr>
+          <a:xfrm rot="18839738">
+            <a:off x="3405780" y="2400901"/>
+            <a:ext cx="1770310" cy="905997"/>
+          </a:xfrm>
+          <a:prstGeom prst="corner">
+            <a:avLst>
+              <a:gd name="adj1" fmla="val 35376"/>
+              <a:gd name="adj2" fmla="val 34777"/>
+            </a:avLst>
+          </a:prstGeom>
+          <a:solidFill>
+            <a:schemeClr val="tx1"/>
+          </a:solidFill>
+          <a:ln>
+            <a:noFill/>
+          </a:ln>
+          <a:scene3d>
+            <a:camera prst="orthographicFront"/>
+            <a:lightRig rig="threePt" dir="t"/>
+          </a:scene3d>
+          <a:sp3d>
+            <a:bevelT/>
+          </a:sp3d>
+        </p:spPr>
+        <p:style>
+          <a:lnRef idx="2">
+            <a:schemeClr val="accent1">
+              <a:shade val="50000"/>
+            </a:schemeClr>
+          </a:lnRef>
+          <a:fillRef idx="1">
+            <a:schemeClr val="accent1"/>
+          </a:fillRef>
+          <a:effectRef idx="0">
+            <a:schemeClr val="accent1"/>
+          </a:effectRef>
+          <a:fontRef idx="minor">
+            <a:schemeClr val="lt1"/>
+          </a:fontRef>
+        </p:style>
+        <p:txBody>
+          <a:bodyPr rtlCol="0" anchor="ctr"/>
+          <a:lstStyle/>
+          <a:p>
+            <a:pPr algn="ctr"/>
+            <a:endParaRPr lang="en-US"/>
+          </a:p>
+        </p:txBody>
+      </p:sp>
+      <p:sp>
+        <p:nvSpPr>
+          <p:cNvPr id="8" name="Oval 7"/>
+          <p:cNvSpPr/>
+          <p:nvPr/>
+        </p:nvSpPr>
+        <p:spPr>
+          <a:xfrm>
+            <a:off x="6492614" y="1902470"/>
+            <a:ext cx="2565855" cy="2302677"/>
+          </a:xfrm>
+          <a:prstGeom prst="ellipse">
+            <a:avLst/>
+          </a:prstGeom>
+          <a:noFill/>
+          <a:ln w="76200">
+            <a:solidFill>
+              <a:schemeClr val="tx1"/>
+            </a:solidFill>
+          </a:ln>
+          <a:scene3d>
+            <a:camera prst="orthographicFront"/>
+            <a:lightRig rig="chilly" dir="t"/>
+          </a:scene3d>
+          <a:sp3d>
+            <a:bevelT w="152400" h="50800" prst="softRound"/>
+          </a:sp3d>
+        </p:spPr>
+        <p:style>
+          <a:lnRef idx="2">
+            <a:schemeClr val="accent1">
+              <a:shade val="50000"/>
+            </a:schemeClr>
+          </a:lnRef>
+          <a:fillRef idx="1">
+            <a:schemeClr val="accent1"/>
+          </a:fillRef>
+          <a:effectRef idx="0">
+            <a:schemeClr val="accent1"/>
+          </a:effectRef>
+          <a:fontRef idx="minor">
+            <a:schemeClr val="lt1"/>
+          </a:fontRef>
+        </p:style>
+        <p:txBody>
+          <a:bodyPr rtlCol="0" anchor="ctr"/>
+          <a:lstStyle/>
+          <a:p>
+            <a:pPr algn="ctr"/>
+            <a:endParaRPr lang="en-US"/>
+          </a:p>
+        </p:txBody>
+      </p:sp>
+      <p:sp>
+        <p:nvSpPr>
+          <p:cNvPr id="9" name="Cross 8"/>
+          <p:cNvSpPr/>
+          <p:nvPr/>
+        </p:nvSpPr>
+        <p:spPr>
+          <a:xfrm rot="18827669">
+            <a:off x="6898006" y="2192925"/>
+            <a:ext cx="1755073" cy="1721765"/>
+          </a:xfrm>
+          <a:prstGeom prst="plus">
+            <a:avLst>
+              <a:gd name="adj" fmla="val 39812"/>
+            </a:avLst>
+          </a:prstGeom>
+          <a:solidFill>
+            <a:schemeClr val="tx1"/>
+          </a:solidFill>
+          <a:ln>
+            <a:solidFill>
+              <a:schemeClr val="tx1"/>
+            </a:solidFill>
+          </a:ln>
+          <a:scene3d>
+            <a:camera prst="orthographicFront"/>
+            <a:lightRig rig="threePt" dir="t"/>
+          </a:scene3d>
+          <a:sp3d>
+            <a:bevelT/>
+          </a:sp3d>
+        </p:spPr>
+        <p:style>
+          <a:lnRef idx="2">
+            <a:schemeClr val="accent1">
+              <a:shade val="50000"/>
+            </a:schemeClr>
+          </a:lnRef>
+          <a:fillRef idx="1">
+            <a:schemeClr val="accent1"/>
+          </a:fillRef>
+          <a:effectRef idx="0">
+            <a:schemeClr val="accent1"/>
+          </a:effectRef>
+          <a:fontRef idx="minor">
+            <a:schemeClr val="lt1"/>
+          </a:fontRef>
+        </p:style>
+        <p:txBody>
+          <a:bodyPr rtlCol="0" anchor="ctr"/>
+          <a:lstStyle/>
+          <a:p>
+            <a:pPr algn="ctr"/>
+            <a:endParaRPr lang="en-US"/>
+          </a:p>
+        </p:txBody>
+      </p:sp>
+    </p:spTree>
+    <p:extLst>
+      <p:ext uri="{BB962C8B-B14F-4D97-AF65-F5344CB8AC3E}">
+        <p14:creationId xmlns:p14="http://schemas.microsoft.com/office/powerpoint/2010/main" val="3447109581"/>
+      </p:ext>
+    </p:extLst>
+  </p:cSld>
+  <p:clrMapOvr>
+    <a:masterClrMapping/>
+  </p:clrMapOvr>
+</p:sld>
+</file>
+
 <file path=ppt/theme/theme1.xml><?xml version="1.0" encoding="utf-8"?>
 <a:theme xmlns:a="http://schemas.openxmlformats.org/drawingml/2006/main" name="Office Theme">
   <a:themeElements>

</xml_diff>